<commit_message>
dongdeji sudo chmod -R 777 for all file
</commit_message>
<xml_diff>
--- a/RISCV相关分享.pptx
+++ b/RISCV相关分享.pptx
@@ -4,21 +4,22 @@
   <p:sldMasterIdLst>
     <p:sldMasterId id="2147483648" r:id="rId2"/>
     <p:sldMasterId id="2147483661" r:id="rId3"/>
+    <p:sldMasterId id="2147483674" r:id="rId4"/>
   </p:sldMasterIdLst>
   <p:sldIdLst>
-    <p:sldId id="256" r:id="rId4"/>
-    <p:sldId id="257" r:id="rId5"/>
-    <p:sldId id="258" r:id="rId6"/>
-    <p:sldId id="259" r:id="rId7"/>
-    <p:sldId id="260" r:id="rId8"/>
-    <p:sldId id="261" r:id="rId9"/>
-    <p:sldId id="262" r:id="rId10"/>
-    <p:sldId id="263" r:id="rId11"/>
-    <p:sldId id="264" r:id="rId12"/>
-    <p:sldId id="265" r:id="rId13"/>
-    <p:sldId id="266" r:id="rId14"/>
-    <p:sldId id="267" r:id="rId15"/>
-    <p:sldId id="268" r:id="rId16"/>
+    <p:sldId id="256" r:id="rId5"/>
+    <p:sldId id="257" r:id="rId6"/>
+    <p:sldId id="258" r:id="rId7"/>
+    <p:sldId id="259" r:id="rId8"/>
+    <p:sldId id="260" r:id="rId9"/>
+    <p:sldId id="261" r:id="rId10"/>
+    <p:sldId id="262" r:id="rId11"/>
+    <p:sldId id="263" r:id="rId12"/>
+    <p:sldId id="264" r:id="rId13"/>
+    <p:sldId id="265" r:id="rId14"/>
+    <p:sldId id="266" r:id="rId15"/>
+    <p:sldId id="267" r:id="rId16"/>
+    <p:sldId id="268" r:id="rId17"/>
   </p:sldIdLst>
   <p:sldSz cx="10080625" cy="5670550"/>
   <p:notesSz cx="7559675" cy="10691812"/>
@@ -77,7 +78,7 @@
         <p:spPr>
           <a:xfrm>
             <a:off x="504000" y="226080"/>
-            <a:ext cx="9070920" cy="945720"/>
+            <a:ext cx="9072000" cy="946440"/>
           </a:xfrm>
           <a:prstGeom prst="rect">
             <a:avLst/>
@@ -108,7 +109,7 @@
         <p:spPr>
           <a:xfrm>
             <a:off x="504000" y="1326600"/>
-            <a:ext cx="9071640" cy="1568160"/>
+            <a:ext cx="9072000" cy="1568520"/>
           </a:xfrm>
           <a:prstGeom prst="rect">
             <a:avLst/>
@@ -137,8 +138,8 @@
         </p:nvSpPr>
         <p:spPr>
           <a:xfrm>
-            <a:off x="504000" y="3044160"/>
-            <a:ext cx="9071640" cy="1568160"/>
+            <a:off x="504000" y="3044520"/>
+            <a:ext cx="9072000" cy="1568520"/>
           </a:xfrm>
           <a:prstGeom prst="rect">
             <a:avLst/>
@@ -190,7 +191,7 @@
         <p:spPr>
           <a:xfrm>
             <a:off x="504000" y="226080"/>
-            <a:ext cx="9070920" cy="945720"/>
+            <a:ext cx="9072000" cy="946440"/>
           </a:xfrm>
           <a:prstGeom prst="rect">
             <a:avLst/>
@@ -221,7 +222,7 @@
         <p:spPr>
           <a:xfrm>
             <a:off x="504000" y="1326600"/>
-            <a:ext cx="4426920" cy="1568160"/>
+            <a:ext cx="4426920" cy="1568520"/>
           </a:xfrm>
           <a:prstGeom prst="rect">
             <a:avLst/>
@@ -251,7 +252,7 @@
         <p:spPr>
           <a:xfrm>
             <a:off x="5152680" y="1326600"/>
-            <a:ext cx="4426920" cy="1568160"/>
+            <a:ext cx="4426920" cy="1568520"/>
           </a:xfrm>
           <a:prstGeom prst="rect">
             <a:avLst/>
@@ -280,8 +281,8 @@
         </p:nvSpPr>
         <p:spPr>
           <a:xfrm>
-            <a:off x="504000" y="3044160"/>
-            <a:ext cx="4426920" cy="1568160"/>
+            <a:off x="504000" y="3044520"/>
+            <a:ext cx="4426920" cy="1568520"/>
           </a:xfrm>
           <a:prstGeom prst="rect">
             <a:avLst/>
@@ -310,8 +311,8 @@
         </p:nvSpPr>
         <p:spPr>
           <a:xfrm>
-            <a:off x="5152680" y="3044160"/>
-            <a:ext cx="4426920" cy="1568160"/>
+            <a:off x="5152680" y="3044520"/>
+            <a:ext cx="4426920" cy="1568520"/>
           </a:xfrm>
           <a:prstGeom prst="rect">
             <a:avLst/>
@@ -363,7 +364,7 @@
         <p:spPr>
           <a:xfrm>
             <a:off x="504000" y="226080"/>
-            <a:ext cx="9070920" cy="945720"/>
+            <a:ext cx="9072000" cy="946440"/>
           </a:xfrm>
           <a:prstGeom prst="rect">
             <a:avLst/>
@@ -394,7 +395,7 @@
         <p:spPr>
           <a:xfrm>
             <a:off x="504000" y="1326600"/>
-            <a:ext cx="2920680" cy="1568160"/>
+            <a:ext cx="2921040" cy="1568520"/>
           </a:xfrm>
           <a:prstGeom prst="rect">
             <a:avLst/>
@@ -423,8 +424,8 @@
         </p:nvSpPr>
         <p:spPr>
           <a:xfrm>
-            <a:off x="3571200" y="1326600"/>
-            <a:ext cx="2920680" cy="1568160"/>
+            <a:off x="3571560" y="1326600"/>
+            <a:ext cx="2921040" cy="1568520"/>
           </a:xfrm>
           <a:prstGeom prst="rect">
             <a:avLst/>
@@ -453,8 +454,8 @@
         </p:nvSpPr>
         <p:spPr>
           <a:xfrm>
-            <a:off x="6638040" y="1326600"/>
-            <a:ext cx="2920680" cy="1568160"/>
+            <a:off x="6639120" y="1326600"/>
+            <a:ext cx="2921040" cy="1568520"/>
           </a:xfrm>
           <a:prstGeom prst="rect">
             <a:avLst/>
@@ -483,8 +484,8 @@
         </p:nvSpPr>
         <p:spPr>
           <a:xfrm>
-            <a:off x="504000" y="3044160"/>
-            <a:ext cx="2920680" cy="1568160"/>
+            <a:off x="504000" y="3044520"/>
+            <a:ext cx="2921040" cy="1568520"/>
           </a:xfrm>
           <a:prstGeom prst="rect">
             <a:avLst/>
@@ -513,8 +514,8 @@
         </p:nvSpPr>
         <p:spPr>
           <a:xfrm>
-            <a:off x="3571200" y="3044160"/>
-            <a:ext cx="2920680" cy="1568160"/>
+            <a:off x="3571560" y="3044520"/>
+            <a:ext cx="2921040" cy="1568520"/>
           </a:xfrm>
           <a:prstGeom prst="rect">
             <a:avLst/>
@@ -543,8 +544,8 @@
         </p:nvSpPr>
         <p:spPr>
           <a:xfrm>
-            <a:off x="6638040" y="3044160"/>
-            <a:ext cx="2920680" cy="1568160"/>
+            <a:off x="6639120" y="3044520"/>
+            <a:ext cx="2921040" cy="1568520"/>
           </a:xfrm>
           <a:prstGeom prst="rect">
             <a:avLst/>
@@ -618,7 +619,7 @@
         <p:spPr>
           <a:xfrm>
             <a:off x="504000" y="226080"/>
-            <a:ext cx="9070920" cy="945720"/>
+            <a:ext cx="9072000" cy="946440"/>
           </a:xfrm>
           <a:prstGeom prst="rect">
             <a:avLst/>
@@ -649,7 +650,7 @@
         <p:spPr>
           <a:xfrm>
             <a:off x="504000" y="1326600"/>
-            <a:ext cx="9071640" cy="3288240"/>
+            <a:ext cx="9072000" cy="3288600"/>
           </a:xfrm>
           <a:prstGeom prst="rect">
             <a:avLst/>
@@ -702,7 +703,7 @@
         <p:spPr>
           <a:xfrm>
             <a:off x="504000" y="226080"/>
-            <a:ext cx="9070920" cy="945720"/>
+            <a:ext cx="9072000" cy="946440"/>
           </a:xfrm>
           <a:prstGeom prst="rect">
             <a:avLst/>
@@ -733,7 +734,7 @@
         <p:spPr>
           <a:xfrm>
             <a:off x="504000" y="1326600"/>
-            <a:ext cx="9071640" cy="3288240"/>
+            <a:ext cx="9072000" cy="3288600"/>
           </a:xfrm>
           <a:prstGeom prst="rect">
             <a:avLst/>
@@ -785,7 +786,7 @@
         <p:spPr>
           <a:xfrm>
             <a:off x="504000" y="226080"/>
-            <a:ext cx="9070920" cy="945720"/>
+            <a:ext cx="9072000" cy="946440"/>
           </a:xfrm>
           <a:prstGeom prst="rect">
             <a:avLst/>
@@ -816,7 +817,7 @@
         <p:spPr>
           <a:xfrm>
             <a:off x="504000" y="1326600"/>
-            <a:ext cx="4426920" cy="3288240"/>
+            <a:ext cx="4426920" cy="3288600"/>
           </a:xfrm>
           <a:prstGeom prst="rect">
             <a:avLst/>
@@ -846,7 +847,7 @@
         <p:spPr>
           <a:xfrm>
             <a:off x="5152680" y="1326600"/>
-            <a:ext cx="4426920" cy="3288240"/>
+            <a:ext cx="4426920" cy="3288600"/>
           </a:xfrm>
           <a:prstGeom prst="rect">
             <a:avLst/>
@@ -898,7 +899,7 @@
         <p:spPr>
           <a:xfrm>
             <a:off x="504000" y="226080"/>
-            <a:ext cx="9070920" cy="945720"/>
+            <a:ext cx="9072000" cy="946440"/>
           </a:xfrm>
           <a:prstGeom prst="rect">
             <a:avLst/>
@@ -951,7 +952,7 @@
         <p:spPr>
           <a:xfrm>
             <a:off x="504000" y="226080"/>
-            <a:ext cx="9070920" cy="4385160"/>
+            <a:ext cx="9072000" cy="4388400"/>
           </a:xfrm>
           <a:prstGeom prst="rect">
             <a:avLst/>
@@ -1004,7 +1005,7 @@
         <p:spPr>
           <a:xfrm>
             <a:off x="504000" y="226080"/>
-            <a:ext cx="9070920" cy="945720"/>
+            <a:ext cx="9072000" cy="946440"/>
           </a:xfrm>
           <a:prstGeom prst="rect">
             <a:avLst/>
@@ -1035,7 +1036,7 @@
         <p:spPr>
           <a:xfrm>
             <a:off x="504000" y="1326600"/>
-            <a:ext cx="4426920" cy="1568160"/>
+            <a:ext cx="4426920" cy="1568520"/>
           </a:xfrm>
           <a:prstGeom prst="rect">
             <a:avLst/>
@@ -1065,7 +1066,7 @@
         <p:spPr>
           <a:xfrm>
             <a:off x="5152680" y="1326600"/>
-            <a:ext cx="4426920" cy="3288240"/>
+            <a:ext cx="4426920" cy="3288600"/>
           </a:xfrm>
           <a:prstGeom prst="rect">
             <a:avLst/>
@@ -1094,8 +1095,8 @@
         </p:nvSpPr>
         <p:spPr>
           <a:xfrm>
-            <a:off x="504000" y="3044160"/>
-            <a:ext cx="4426920" cy="1568160"/>
+            <a:off x="504000" y="3044520"/>
+            <a:ext cx="4426920" cy="1568520"/>
           </a:xfrm>
           <a:prstGeom prst="rect">
             <a:avLst/>
@@ -1147,7 +1148,7 @@
         <p:spPr>
           <a:xfrm>
             <a:off x="504000" y="226080"/>
-            <a:ext cx="9070920" cy="945720"/>
+            <a:ext cx="9072000" cy="946440"/>
           </a:xfrm>
           <a:prstGeom prst="rect">
             <a:avLst/>
@@ -1178,7 +1179,7 @@
         <p:spPr>
           <a:xfrm>
             <a:off x="504000" y="1326600"/>
-            <a:ext cx="9071640" cy="3288240"/>
+            <a:ext cx="9072000" cy="3288600"/>
           </a:xfrm>
           <a:prstGeom prst="rect">
             <a:avLst/>
@@ -1231,7 +1232,7 @@
         <p:spPr>
           <a:xfrm>
             <a:off x="504000" y="226080"/>
-            <a:ext cx="9070920" cy="945720"/>
+            <a:ext cx="9072000" cy="946440"/>
           </a:xfrm>
           <a:prstGeom prst="rect">
             <a:avLst/>
@@ -1262,7 +1263,7 @@
         <p:spPr>
           <a:xfrm>
             <a:off x="504000" y="1326600"/>
-            <a:ext cx="4426920" cy="3288240"/>
+            <a:ext cx="4426920" cy="3288600"/>
           </a:xfrm>
           <a:prstGeom prst="rect">
             <a:avLst/>
@@ -1292,7 +1293,7 @@
         <p:spPr>
           <a:xfrm>
             <a:off x="5152680" y="1326600"/>
-            <a:ext cx="4426920" cy="1568160"/>
+            <a:ext cx="4426920" cy="1568520"/>
           </a:xfrm>
           <a:prstGeom prst="rect">
             <a:avLst/>
@@ -1321,8 +1322,8 @@
         </p:nvSpPr>
         <p:spPr>
           <a:xfrm>
-            <a:off x="5152680" y="3044160"/>
-            <a:ext cx="4426920" cy="1568160"/>
+            <a:off x="5152680" y="3044520"/>
+            <a:ext cx="4426920" cy="1568520"/>
           </a:xfrm>
           <a:prstGeom prst="rect">
             <a:avLst/>
@@ -1374,7 +1375,7 @@
         <p:spPr>
           <a:xfrm>
             <a:off x="504000" y="226080"/>
-            <a:ext cx="9070920" cy="945720"/>
+            <a:ext cx="9072000" cy="946440"/>
           </a:xfrm>
           <a:prstGeom prst="rect">
             <a:avLst/>
@@ -1405,7 +1406,7 @@
         <p:spPr>
           <a:xfrm>
             <a:off x="504000" y="1326600"/>
-            <a:ext cx="4426920" cy="1568160"/>
+            <a:ext cx="4426920" cy="1568520"/>
           </a:xfrm>
           <a:prstGeom prst="rect">
             <a:avLst/>
@@ -1435,7 +1436,7 @@
         <p:spPr>
           <a:xfrm>
             <a:off x="5152680" y="1326600"/>
-            <a:ext cx="4426920" cy="1568160"/>
+            <a:ext cx="4426920" cy="1568520"/>
           </a:xfrm>
           <a:prstGeom prst="rect">
             <a:avLst/>
@@ -1464,8 +1465,8 @@
         </p:nvSpPr>
         <p:spPr>
           <a:xfrm>
-            <a:off x="504000" y="3044160"/>
-            <a:ext cx="9071640" cy="1568160"/>
+            <a:off x="504000" y="3044520"/>
+            <a:ext cx="9072000" cy="1568520"/>
           </a:xfrm>
           <a:prstGeom prst="rect">
             <a:avLst/>
@@ -1517,7 +1518,7 @@
         <p:spPr>
           <a:xfrm>
             <a:off x="504000" y="226080"/>
-            <a:ext cx="9070920" cy="945720"/>
+            <a:ext cx="9072000" cy="946440"/>
           </a:xfrm>
           <a:prstGeom prst="rect">
             <a:avLst/>
@@ -1548,7 +1549,7 @@
         <p:spPr>
           <a:xfrm>
             <a:off x="504000" y="1326600"/>
-            <a:ext cx="9071640" cy="1568160"/>
+            <a:ext cx="9072000" cy="1568520"/>
           </a:xfrm>
           <a:prstGeom prst="rect">
             <a:avLst/>
@@ -1577,8 +1578,8 @@
         </p:nvSpPr>
         <p:spPr>
           <a:xfrm>
-            <a:off x="504000" y="3044160"/>
-            <a:ext cx="9071640" cy="1568160"/>
+            <a:off x="504000" y="3044520"/>
+            <a:ext cx="9072000" cy="1568520"/>
           </a:xfrm>
           <a:prstGeom prst="rect">
             <a:avLst/>
@@ -1630,7 +1631,7 @@
         <p:spPr>
           <a:xfrm>
             <a:off x="504000" y="226080"/>
-            <a:ext cx="9070920" cy="945720"/>
+            <a:ext cx="9072000" cy="946440"/>
           </a:xfrm>
           <a:prstGeom prst="rect">
             <a:avLst/>
@@ -1661,7 +1662,7 @@
         <p:spPr>
           <a:xfrm>
             <a:off x="504000" y="1326600"/>
-            <a:ext cx="4426920" cy="1568160"/>
+            <a:ext cx="4426920" cy="1568520"/>
           </a:xfrm>
           <a:prstGeom prst="rect">
             <a:avLst/>
@@ -1691,7 +1692,7 @@
         <p:spPr>
           <a:xfrm>
             <a:off x="5152680" y="1326600"/>
-            <a:ext cx="4426920" cy="1568160"/>
+            <a:ext cx="4426920" cy="1568520"/>
           </a:xfrm>
           <a:prstGeom prst="rect">
             <a:avLst/>
@@ -1720,8 +1721,8 @@
         </p:nvSpPr>
         <p:spPr>
           <a:xfrm>
-            <a:off x="504000" y="3044160"/>
-            <a:ext cx="4426920" cy="1568160"/>
+            <a:off x="504000" y="3044520"/>
+            <a:ext cx="4426920" cy="1568520"/>
           </a:xfrm>
           <a:prstGeom prst="rect">
             <a:avLst/>
@@ -1750,8 +1751,8 @@
         </p:nvSpPr>
         <p:spPr>
           <a:xfrm>
-            <a:off x="5152680" y="3044160"/>
-            <a:ext cx="4426920" cy="1568160"/>
+            <a:off x="5152680" y="3044520"/>
+            <a:ext cx="4426920" cy="1568520"/>
           </a:xfrm>
           <a:prstGeom prst="rect">
             <a:avLst/>
@@ -1803,7 +1804,7 @@
         <p:spPr>
           <a:xfrm>
             <a:off x="504000" y="226080"/>
-            <a:ext cx="9070920" cy="945720"/>
+            <a:ext cx="9072000" cy="946440"/>
           </a:xfrm>
           <a:prstGeom prst="rect">
             <a:avLst/>
@@ -1834,7 +1835,7 @@
         <p:spPr>
           <a:xfrm>
             <a:off x="504000" y="1326600"/>
-            <a:ext cx="2920680" cy="1568160"/>
+            <a:ext cx="2921040" cy="1568520"/>
           </a:xfrm>
           <a:prstGeom prst="rect">
             <a:avLst/>
@@ -1863,8 +1864,8 @@
         </p:nvSpPr>
         <p:spPr>
           <a:xfrm>
-            <a:off x="3571200" y="1326600"/>
-            <a:ext cx="2920680" cy="1568160"/>
+            <a:off x="3571560" y="1326600"/>
+            <a:ext cx="2921040" cy="1568520"/>
           </a:xfrm>
           <a:prstGeom prst="rect">
             <a:avLst/>
@@ -1893,8 +1894,8 @@
         </p:nvSpPr>
         <p:spPr>
           <a:xfrm>
-            <a:off x="6638040" y="1326600"/>
-            <a:ext cx="2920680" cy="1568160"/>
+            <a:off x="6639120" y="1326600"/>
+            <a:ext cx="2921040" cy="1568520"/>
           </a:xfrm>
           <a:prstGeom prst="rect">
             <a:avLst/>
@@ -1923,8 +1924,8 @@
         </p:nvSpPr>
         <p:spPr>
           <a:xfrm>
-            <a:off x="504000" y="3044160"/>
-            <a:ext cx="2920680" cy="1568160"/>
+            <a:off x="504000" y="3044520"/>
+            <a:ext cx="2921040" cy="1568520"/>
           </a:xfrm>
           <a:prstGeom prst="rect">
             <a:avLst/>
@@ -1953,8 +1954,8 @@
         </p:nvSpPr>
         <p:spPr>
           <a:xfrm>
-            <a:off x="3571200" y="3044160"/>
-            <a:ext cx="2920680" cy="1568160"/>
+            <a:off x="3571560" y="3044520"/>
+            <a:ext cx="2921040" cy="1568520"/>
           </a:xfrm>
           <a:prstGeom prst="rect">
             <a:avLst/>
@@ -1983,8 +1984,8 @@
         </p:nvSpPr>
         <p:spPr>
           <a:xfrm>
-            <a:off x="6638040" y="3044160"/>
-            <a:ext cx="2920680" cy="1568160"/>
+            <a:off x="6639120" y="3044520"/>
+            <a:ext cx="2921040" cy="1568520"/>
           </a:xfrm>
           <a:prstGeom prst="rect">
             <a:avLst/>
@@ -1996,6 +1997,361 @@
           </a:bodyPr>
           <a:p>
             <a:endParaRPr b="0" lang="en-US" sz="3200" spc="-1" strike="noStrike">
+              <a:latin typeface="Arial"/>
+            </a:endParaRPr>
+          </a:p>
+        </p:txBody>
+      </p:sp>
+    </p:spTree>
+  </p:cSld>
+</p:sldLayout>
+</file>
+
+<file path=ppt/slideLayouts/slideLayout25.xml><?xml version="1.0" encoding="utf-8"?>
+<p:sldLayout xmlns:a="http://schemas.openxmlformats.org/drawingml/2006/main" xmlns:p="http://schemas.openxmlformats.org/presentationml/2006/main" xmlns:r="http://schemas.openxmlformats.org/officeDocument/2006/relationships" xmlns:p14="http://schemas.microsoft.com/office/powerpoint/2010/main" xmlns:p15="http://schemas.microsoft.com/office/powerpoint/2012/main" xmlns:mc="http://schemas.openxmlformats.org/markup-compatibility/2006" type="blank" preserve="1">
+  <p:cSld name="Blank Slide">
+    <p:spTree>
+      <p:nvGrpSpPr>
+        <p:cNvPr id="1" name=""/>
+        <p:cNvGrpSpPr/>
+        <p:nvPr/>
+      </p:nvGrpSpPr>
+      <p:grpSpPr>
+        <a:xfrm>
+          <a:off x="0" y="0"/>
+          <a:ext cx="0" cy="0"/>
+          <a:chOff x="0" y="0"/>
+          <a:chExt cx="0" cy="0"/>
+        </a:xfrm>
+      </p:grpSpPr>
+    </p:spTree>
+  </p:cSld>
+</p:sldLayout>
+</file>
+
+<file path=ppt/slideLayouts/slideLayout26.xml><?xml version="1.0" encoding="utf-8"?>
+<p:sldLayout xmlns:a="http://schemas.openxmlformats.org/drawingml/2006/main" xmlns:p="http://schemas.openxmlformats.org/presentationml/2006/main" xmlns:r="http://schemas.openxmlformats.org/officeDocument/2006/relationships" xmlns:p14="http://schemas.microsoft.com/office/powerpoint/2010/main" xmlns:p15="http://schemas.microsoft.com/office/powerpoint/2012/main" xmlns:mc="http://schemas.openxmlformats.org/markup-compatibility/2006" type="tx" preserve="1">
+  <p:cSld name="Title Slide">
+    <p:spTree>
+      <p:nvGrpSpPr>
+        <p:cNvPr id="1" name=""/>
+        <p:cNvGrpSpPr/>
+        <p:nvPr/>
+      </p:nvGrpSpPr>
+      <p:grpSpPr>
+        <a:xfrm>
+          <a:off x="0" y="0"/>
+          <a:ext cx="0" cy="0"/>
+          <a:chOff x="0" y="0"/>
+          <a:chExt cx="0" cy="0"/>
+        </a:xfrm>
+      </p:grpSpPr>
+      <p:sp>
+        <p:nvSpPr>
+          <p:cNvPr id="78" name="PlaceHolder 1"/>
+          <p:cNvSpPr>
+            <a:spLocks noGrp="1"/>
+          </p:cNvSpPr>
+          <p:nvPr>
+            <p:ph type="title"/>
+          </p:nvPr>
+        </p:nvSpPr>
+        <p:spPr>
+          <a:xfrm>
+            <a:off x="504000" y="226080"/>
+            <a:ext cx="9072000" cy="946440"/>
+          </a:xfrm>
+          <a:prstGeom prst="rect">
+            <a:avLst/>
+          </a:prstGeom>
+        </p:spPr>
+        <p:txBody>
+          <a:bodyPr lIns="0" rIns="0" tIns="0" bIns="0" anchor="ctr">
+            <a:noAutofit/>
+          </a:bodyPr>
+          <a:p>
+            <a:pPr algn="ctr"/>
+            <a:endParaRPr b="0" lang="en-US" sz="4400" spc="-1" strike="noStrike">
+              <a:latin typeface="Arial"/>
+            </a:endParaRPr>
+          </a:p>
+        </p:txBody>
+      </p:sp>
+      <p:sp>
+        <p:nvSpPr>
+          <p:cNvPr id="79" name="PlaceHolder 2"/>
+          <p:cNvSpPr>
+            <a:spLocks noGrp="1"/>
+          </p:cNvSpPr>
+          <p:nvPr>
+            <p:ph type="subTitle"/>
+          </p:nvPr>
+        </p:nvSpPr>
+        <p:spPr>
+          <a:xfrm>
+            <a:off x="504000" y="1326600"/>
+            <a:ext cx="9072000" cy="3288600"/>
+          </a:xfrm>
+          <a:prstGeom prst="rect">
+            <a:avLst/>
+          </a:prstGeom>
+        </p:spPr>
+        <p:txBody>
+          <a:bodyPr lIns="0" rIns="0" tIns="0" bIns="0" anchor="ctr">
+            <a:noAutofit/>
+          </a:bodyPr>
+          <a:p>
+            <a:pPr algn="ctr"/>
+            <a:endParaRPr b="0" lang="en-US" sz="3200" spc="-1" strike="noStrike">
+              <a:latin typeface="Arial"/>
+            </a:endParaRPr>
+          </a:p>
+        </p:txBody>
+      </p:sp>
+    </p:spTree>
+  </p:cSld>
+</p:sldLayout>
+</file>
+
+<file path=ppt/slideLayouts/slideLayout27.xml><?xml version="1.0" encoding="utf-8"?>
+<p:sldLayout xmlns:a="http://schemas.openxmlformats.org/drawingml/2006/main" xmlns:p="http://schemas.openxmlformats.org/presentationml/2006/main" xmlns:r="http://schemas.openxmlformats.org/officeDocument/2006/relationships" xmlns:p14="http://schemas.microsoft.com/office/powerpoint/2010/main" xmlns:p15="http://schemas.microsoft.com/office/powerpoint/2012/main" xmlns:mc="http://schemas.openxmlformats.org/markup-compatibility/2006" type="obj" preserve="1">
+  <p:cSld name="Title, Content">
+    <p:spTree>
+      <p:nvGrpSpPr>
+        <p:cNvPr id="1" name=""/>
+        <p:cNvGrpSpPr/>
+        <p:nvPr/>
+      </p:nvGrpSpPr>
+      <p:grpSpPr>
+        <a:xfrm>
+          <a:off x="0" y="0"/>
+          <a:ext cx="0" cy="0"/>
+          <a:chOff x="0" y="0"/>
+          <a:chExt cx="0" cy="0"/>
+        </a:xfrm>
+      </p:grpSpPr>
+      <p:sp>
+        <p:nvSpPr>
+          <p:cNvPr id="80" name="PlaceHolder 1"/>
+          <p:cNvSpPr>
+            <a:spLocks noGrp="1"/>
+          </p:cNvSpPr>
+          <p:nvPr>
+            <p:ph type="title"/>
+          </p:nvPr>
+        </p:nvSpPr>
+        <p:spPr>
+          <a:xfrm>
+            <a:off x="504000" y="226080"/>
+            <a:ext cx="9072000" cy="946440"/>
+          </a:xfrm>
+          <a:prstGeom prst="rect">
+            <a:avLst/>
+          </a:prstGeom>
+        </p:spPr>
+        <p:txBody>
+          <a:bodyPr lIns="0" rIns="0" tIns="0" bIns="0" anchor="ctr">
+            <a:noAutofit/>
+          </a:bodyPr>
+          <a:p>
+            <a:pPr algn="ctr"/>
+            <a:endParaRPr b="0" lang="en-US" sz="4400" spc="-1" strike="noStrike">
+              <a:latin typeface="Arial"/>
+            </a:endParaRPr>
+          </a:p>
+        </p:txBody>
+      </p:sp>
+      <p:sp>
+        <p:nvSpPr>
+          <p:cNvPr id="81" name="PlaceHolder 2"/>
+          <p:cNvSpPr>
+            <a:spLocks noGrp="1"/>
+          </p:cNvSpPr>
+          <p:nvPr>
+            <p:ph type="body"/>
+          </p:nvPr>
+        </p:nvSpPr>
+        <p:spPr>
+          <a:xfrm>
+            <a:off x="504000" y="1326600"/>
+            <a:ext cx="9072000" cy="3288600"/>
+          </a:xfrm>
+          <a:prstGeom prst="rect">
+            <a:avLst/>
+          </a:prstGeom>
+        </p:spPr>
+        <p:txBody>
+          <a:bodyPr lIns="0" rIns="0" tIns="0" bIns="0">
+            <a:normAutofit/>
+          </a:bodyPr>
+          <a:p>
+            <a:endParaRPr b="0" lang="en-US" sz="3200" spc="-1" strike="noStrike">
+              <a:latin typeface="Arial"/>
+            </a:endParaRPr>
+          </a:p>
+        </p:txBody>
+      </p:sp>
+    </p:spTree>
+  </p:cSld>
+</p:sldLayout>
+</file>
+
+<file path=ppt/slideLayouts/slideLayout28.xml><?xml version="1.0" encoding="utf-8"?>
+<p:sldLayout xmlns:a="http://schemas.openxmlformats.org/drawingml/2006/main" xmlns:p="http://schemas.openxmlformats.org/presentationml/2006/main" xmlns:r="http://schemas.openxmlformats.org/officeDocument/2006/relationships" xmlns:p14="http://schemas.microsoft.com/office/powerpoint/2010/main" xmlns:p15="http://schemas.microsoft.com/office/powerpoint/2012/main" xmlns:mc="http://schemas.openxmlformats.org/markup-compatibility/2006" type="twoObj" preserve="1">
+  <p:cSld name="Title, 2 Content">
+    <p:spTree>
+      <p:nvGrpSpPr>
+        <p:cNvPr id="1" name=""/>
+        <p:cNvGrpSpPr/>
+        <p:nvPr/>
+      </p:nvGrpSpPr>
+      <p:grpSpPr>
+        <a:xfrm>
+          <a:off x="0" y="0"/>
+          <a:ext cx="0" cy="0"/>
+          <a:chOff x="0" y="0"/>
+          <a:chExt cx="0" cy="0"/>
+        </a:xfrm>
+      </p:grpSpPr>
+      <p:sp>
+        <p:nvSpPr>
+          <p:cNvPr id="82" name="PlaceHolder 1"/>
+          <p:cNvSpPr>
+            <a:spLocks noGrp="1"/>
+          </p:cNvSpPr>
+          <p:nvPr>
+            <p:ph type="title"/>
+          </p:nvPr>
+        </p:nvSpPr>
+        <p:spPr>
+          <a:xfrm>
+            <a:off x="504000" y="226080"/>
+            <a:ext cx="9072000" cy="946440"/>
+          </a:xfrm>
+          <a:prstGeom prst="rect">
+            <a:avLst/>
+          </a:prstGeom>
+        </p:spPr>
+        <p:txBody>
+          <a:bodyPr lIns="0" rIns="0" tIns="0" bIns="0" anchor="ctr">
+            <a:noAutofit/>
+          </a:bodyPr>
+          <a:p>
+            <a:pPr algn="ctr"/>
+            <a:endParaRPr b="0" lang="en-US" sz="4400" spc="-1" strike="noStrike">
+              <a:latin typeface="Arial"/>
+            </a:endParaRPr>
+          </a:p>
+        </p:txBody>
+      </p:sp>
+      <p:sp>
+        <p:nvSpPr>
+          <p:cNvPr id="83" name="PlaceHolder 2"/>
+          <p:cNvSpPr>
+            <a:spLocks noGrp="1"/>
+          </p:cNvSpPr>
+          <p:nvPr>
+            <p:ph type="body"/>
+          </p:nvPr>
+        </p:nvSpPr>
+        <p:spPr>
+          <a:xfrm>
+            <a:off x="504000" y="1326600"/>
+            <a:ext cx="4426920" cy="3288600"/>
+          </a:xfrm>
+          <a:prstGeom prst="rect">
+            <a:avLst/>
+          </a:prstGeom>
+        </p:spPr>
+        <p:txBody>
+          <a:bodyPr lIns="0" rIns="0" tIns="0" bIns="0">
+            <a:normAutofit/>
+          </a:bodyPr>
+          <a:p>
+            <a:endParaRPr b="0" lang="en-US" sz="3200" spc="-1" strike="noStrike">
+              <a:latin typeface="Arial"/>
+            </a:endParaRPr>
+          </a:p>
+        </p:txBody>
+      </p:sp>
+      <p:sp>
+        <p:nvSpPr>
+          <p:cNvPr id="84" name="PlaceHolder 3"/>
+          <p:cNvSpPr>
+            <a:spLocks noGrp="1"/>
+          </p:cNvSpPr>
+          <p:nvPr>
+            <p:ph type="body"/>
+          </p:nvPr>
+        </p:nvSpPr>
+        <p:spPr>
+          <a:xfrm>
+            <a:off x="5152680" y="1326600"/>
+            <a:ext cx="4426920" cy="3288600"/>
+          </a:xfrm>
+          <a:prstGeom prst="rect">
+            <a:avLst/>
+          </a:prstGeom>
+        </p:spPr>
+        <p:txBody>
+          <a:bodyPr lIns="0" rIns="0" tIns="0" bIns="0">
+            <a:normAutofit/>
+          </a:bodyPr>
+          <a:p>
+            <a:endParaRPr b="0" lang="en-US" sz="3200" spc="-1" strike="noStrike">
+              <a:latin typeface="Arial"/>
+            </a:endParaRPr>
+          </a:p>
+        </p:txBody>
+      </p:sp>
+    </p:spTree>
+  </p:cSld>
+</p:sldLayout>
+</file>
+
+<file path=ppt/slideLayouts/slideLayout29.xml><?xml version="1.0" encoding="utf-8"?>
+<p:sldLayout xmlns:a="http://schemas.openxmlformats.org/drawingml/2006/main" xmlns:p="http://schemas.openxmlformats.org/presentationml/2006/main" xmlns:r="http://schemas.openxmlformats.org/officeDocument/2006/relationships" xmlns:p14="http://schemas.microsoft.com/office/powerpoint/2010/main" xmlns:p15="http://schemas.microsoft.com/office/powerpoint/2012/main" xmlns:mc="http://schemas.openxmlformats.org/markup-compatibility/2006" type="titleOnly" preserve="1">
+  <p:cSld name="Title Only">
+    <p:spTree>
+      <p:nvGrpSpPr>
+        <p:cNvPr id="1" name=""/>
+        <p:cNvGrpSpPr/>
+        <p:nvPr/>
+      </p:nvGrpSpPr>
+      <p:grpSpPr>
+        <a:xfrm>
+          <a:off x="0" y="0"/>
+          <a:ext cx="0" cy="0"/>
+          <a:chOff x="0" y="0"/>
+          <a:chExt cx="0" cy="0"/>
+        </a:xfrm>
+      </p:grpSpPr>
+      <p:sp>
+        <p:nvSpPr>
+          <p:cNvPr id="85" name="PlaceHolder 1"/>
+          <p:cNvSpPr>
+            <a:spLocks noGrp="1"/>
+          </p:cNvSpPr>
+          <p:nvPr>
+            <p:ph type="title"/>
+          </p:nvPr>
+        </p:nvSpPr>
+        <p:spPr>
+          <a:xfrm>
+            <a:off x="504000" y="226080"/>
+            <a:ext cx="9072000" cy="946440"/>
+          </a:xfrm>
+          <a:prstGeom prst="rect">
+            <a:avLst/>
+          </a:prstGeom>
+        </p:spPr>
+        <p:txBody>
+          <a:bodyPr lIns="0" rIns="0" tIns="0" bIns="0" anchor="ctr">
+            <a:noAutofit/>
+          </a:bodyPr>
+          <a:p>
+            <a:pPr algn="ctr"/>
+            <a:endParaRPr b="0" lang="en-US" sz="4400" spc="-1" strike="noStrike">
               <a:latin typeface="Arial"/>
             </a:endParaRPr>
           </a:p>
@@ -2036,7 +2392,7 @@
         <p:spPr>
           <a:xfrm>
             <a:off x="504000" y="226080"/>
-            <a:ext cx="9070920" cy="945720"/>
+            <a:ext cx="9072000" cy="946440"/>
           </a:xfrm>
           <a:prstGeom prst="rect">
             <a:avLst/>
@@ -2067,7 +2423,1008 @@
         <p:spPr>
           <a:xfrm>
             <a:off x="504000" y="1326600"/>
-            <a:ext cx="9071640" cy="3288240"/>
+            <a:ext cx="9072000" cy="3288600"/>
+          </a:xfrm>
+          <a:prstGeom prst="rect">
+            <a:avLst/>
+          </a:prstGeom>
+        </p:spPr>
+        <p:txBody>
+          <a:bodyPr lIns="0" rIns="0" tIns="0" bIns="0">
+            <a:normAutofit/>
+          </a:bodyPr>
+          <a:p>
+            <a:endParaRPr b="0" lang="en-US" sz="3200" spc="-1" strike="noStrike">
+              <a:latin typeface="Arial"/>
+            </a:endParaRPr>
+          </a:p>
+        </p:txBody>
+      </p:sp>
+    </p:spTree>
+  </p:cSld>
+</p:sldLayout>
+</file>
+
+<file path=ppt/slideLayouts/slideLayout30.xml><?xml version="1.0" encoding="utf-8"?>
+<p:sldLayout xmlns:a="http://schemas.openxmlformats.org/drawingml/2006/main" xmlns:p="http://schemas.openxmlformats.org/presentationml/2006/main" xmlns:r="http://schemas.openxmlformats.org/officeDocument/2006/relationships" xmlns:p14="http://schemas.microsoft.com/office/powerpoint/2010/main" xmlns:p15="http://schemas.microsoft.com/office/powerpoint/2012/main" xmlns:mc="http://schemas.openxmlformats.org/markup-compatibility/2006" type="objOnly" preserve="1">
+  <p:cSld name="Centered Text">
+    <p:spTree>
+      <p:nvGrpSpPr>
+        <p:cNvPr id="1" name=""/>
+        <p:cNvGrpSpPr/>
+        <p:nvPr/>
+      </p:nvGrpSpPr>
+      <p:grpSpPr>
+        <a:xfrm>
+          <a:off x="0" y="0"/>
+          <a:ext cx="0" cy="0"/>
+          <a:chOff x="0" y="0"/>
+          <a:chExt cx="0" cy="0"/>
+        </a:xfrm>
+      </p:grpSpPr>
+      <p:sp>
+        <p:nvSpPr>
+          <p:cNvPr id="86" name="PlaceHolder 1"/>
+          <p:cNvSpPr>
+            <a:spLocks noGrp="1"/>
+          </p:cNvSpPr>
+          <p:nvPr>
+            <p:ph type="subTitle"/>
+          </p:nvPr>
+        </p:nvSpPr>
+        <p:spPr>
+          <a:xfrm>
+            <a:off x="504000" y="226080"/>
+            <a:ext cx="9072000" cy="4388400"/>
+          </a:xfrm>
+          <a:prstGeom prst="rect">
+            <a:avLst/>
+          </a:prstGeom>
+        </p:spPr>
+        <p:txBody>
+          <a:bodyPr lIns="0" rIns="0" tIns="0" bIns="0" anchor="ctr">
+            <a:noAutofit/>
+          </a:bodyPr>
+          <a:p>
+            <a:pPr algn="ctr"/>
+            <a:endParaRPr b="0" lang="en-US" sz="3200" spc="-1" strike="noStrike">
+              <a:latin typeface="Arial"/>
+            </a:endParaRPr>
+          </a:p>
+        </p:txBody>
+      </p:sp>
+    </p:spTree>
+  </p:cSld>
+</p:sldLayout>
+</file>
+
+<file path=ppt/slideLayouts/slideLayout31.xml><?xml version="1.0" encoding="utf-8"?>
+<p:sldLayout xmlns:a="http://schemas.openxmlformats.org/drawingml/2006/main" xmlns:p="http://schemas.openxmlformats.org/presentationml/2006/main" xmlns:r="http://schemas.openxmlformats.org/officeDocument/2006/relationships" xmlns:p14="http://schemas.microsoft.com/office/powerpoint/2010/main" xmlns:p15="http://schemas.microsoft.com/office/powerpoint/2012/main" xmlns:mc="http://schemas.openxmlformats.org/markup-compatibility/2006" type="twoObjAndObj" preserve="1">
+  <p:cSld name="Title, 2 Content and Content">
+    <p:spTree>
+      <p:nvGrpSpPr>
+        <p:cNvPr id="1" name=""/>
+        <p:cNvGrpSpPr/>
+        <p:nvPr/>
+      </p:nvGrpSpPr>
+      <p:grpSpPr>
+        <a:xfrm>
+          <a:off x="0" y="0"/>
+          <a:ext cx="0" cy="0"/>
+          <a:chOff x="0" y="0"/>
+          <a:chExt cx="0" cy="0"/>
+        </a:xfrm>
+      </p:grpSpPr>
+      <p:sp>
+        <p:nvSpPr>
+          <p:cNvPr id="87" name="PlaceHolder 1"/>
+          <p:cNvSpPr>
+            <a:spLocks noGrp="1"/>
+          </p:cNvSpPr>
+          <p:nvPr>
+            <p:ph type="title"/>
+          </p:nvPr>
+        </p:nvSpPr>
+        <p:spPr>
+          <a:xfrm>
+            <a:off x="504000" y="226080"/>
+            <a:ext cx="9072000" cy="946440"/>
+          </a:xfrm>
+          <a:prstGeom prst="rect">
+            <a:avLst/>
+          </a:prstGeom>
+        </p:spPr>
+        <p:txBody>
+          <a:bodyPr lIns="0" rIns="0" tIns="0" bIns="0" anchor="ctr">
+            <a:noAutofit/>
+          </a:bodyPr>
+          <a:p>
+            <a:pPr algn="ctr"/>
+            <a:endParaRPr b="0" lang="en-US" sz="4400" spc="-1" strike="noStrike">
+              <a:latin typeface="Arial"/>
+            </a:endParaRPr>
+          </a:p>
+        </p:txBody>
+      </p:sp>
+      <p:sp>
+        <p:nvSpPr>
+          <p:cNvPr id="88" name="PlaceHolder 2"/>
+          <p:cNvSpPr>
+            <a:spLocks noGrp="1"/>
+          </p:cNvSpPr>
+          <p:nvPr>
+            <p:ph type="body"/>
+          </p:nvPr>
+        </p:nvSpPr>
+        <p:spPr>
+          <a:xfrm>
+            <a:off x="504000" y="1326600"/>
+            <a:ext cx="4426920" cy="1568520"/>
+          </a:xfrm>
+          <a:prstGeom prst="rect">
+            <a:avLst/>
+          </a:prstGeom>
+        </p:spPr>
+        <p:txBody>
+          <a:bodyPr lIns="0" rIns="0" tIns="0" bIns="0">
+            <a:normAutofit/>
+          </a:bodyPr>
+          <a:p>
+            <a:endParaRPr b="0" lang="en-US" sz="3200" spc="-1" strike="noStrike">
+              <a:latin typeface="Arial"/>
+            </a:endParaRPr>
+          </a:p>
+        </p:txBody>
+      </p:sp>
+      <p:sp>
+        <p:nvSpPr>
+          <p:cNvPr id="89" name="PlaceHolder 3"/>
+          <p:cNvSpPr>
+            <a:spLocks noGrp="1"/>
+          </p:cNvSpPr>
+          <p:nvPr>
+            <p:ph type="body"/>
+          </p:nvPr>
+        </p:nvSpPr>
+        <p:spPr>
+          <a:xfrm>
+            <a:off x="5152680" y="1326600"/>
+            <a:ext cx="4426920" cy="3288600"/>
+          </a:xfrm>
+          <a:prstGeom prst="rect">
+            <a:avLst/>
+          </a:prstGeom>
+        </p:spPr>
+        <p:txBody>
+          <a:bodyPr lIns="0" rIns="0" tIns="0" bIns="0">
+            <a:normAutofit/>
+          </a:bodyPr>
+          <a:p>
+            <a:endParaRPr b="0" lang="en-US" sz="3200" spc="-1" strike="noStrike">
+              <a:latin typeface="Arial"/>
+            </a:endParaRPr>
+          </a:p>
+        </p:txBody>
+      </p:sp>
+      <p:sp>
+        <p:nvSpPr>
+          <p:cNvPr id="90" name="PlaceHolder 4"/>
+          <p:cNvSpPr>
+            <a:spLocks noGrp="1"/>
+          </p:cNvSpPr>
+          <p:nvPr>
+            <p:ph type="body"/>
+          </p:nvPr>
+        </p:nvSpPr>
+        <p:spPr>
+          <a:xfrm>
+            <a:off x="504000" y="3044520"/>
+            <a:ext cx="4426920" cy="1568520"/>
+          </a:xfrm>
+          <a:prstGeom prst="rect">
+            <a:avLst/>
+          </a:prstGeom>
+        </p:spPr>
+        <p:txBody>
+          <a:bodyPr lIns="0" rIns="0" tIns="0" bIns="0">
+            <a:normAutofit/>
+          </a:bodyPr>
+          <a:p>
+            <a:endParaRPr b="0" lang="en-US" sz="3200" spc="-1" strike="noStrike">
+              <a:latin typeface="Arial"/>
+            </a:endParaRPr>
+          </a:p>
+        </p:txBody>
+      </p:sp>
+    </p:spTree>
+  </p:cSld>
+</p:sldLayout>
+</file>
+
+<file path=ppt/slideLayouts/slideLayout32.xml><?xml version="1.0" encoding="utf-8"?>
+<p:sldLayout xmlns:a="http://schemas.openxmlformats.org/drawingml/2006/main" xmlns:p="http://schemas.openxmlformats.org/presentationml/2006/main" xmlns:r="http://schemas.openxmlformats.org/officeDocument/2006/relationships" xmlns:p14="http://schemas.microsoft.com/office/powerpoint/2010/main" xmlns:p15="http://schemas.microsoft.com/office/powerpoint/2012/main" xmlns:mc="http://schemas.openxmlformats.org/markup-compatibility/2006" type="objAndTwoObj" preserve="1">
+  <p:cSld name="Title Content and 2 Content">
+    <p:spTree>
+      <p:nvGrpSpPr>
+        <p:cNvPr id="1" name=""/>
+        <p:cNvGrpSpPr/>
+        <p:nvPr/>
+      </p:nvGrpSpPr>
+      <p:grpSpPr>
+        <a:xfrm>
+          <a:off x="0" y="0"/>
+          <a:ext cx="0" cy="0"/>
+          <a:chOff x="0" y="0"/>
+          <a:chExt cx="0" cy="0"/>
+        </a:xfrm>
+      </p:grpSpPr>
+      <p:sp>
+        <p:nvSpPr>
+          <p:cNvPr id="91" name="PlaceHolder 1"/>
+          <p:cNvSpPr>
+            <a:spLocks noGrp="1"/>
+          </p:cNvSpPr>
+          <p:nvPr>
+            <p:ph type="title"/>
+          </p:nvPr>
+        </p:nvSpPr>
+        <p:spPr>
+          <a:xfrm>
+            <a:off x="504000" y="226080"/>
+            <a:ext cx="9072000" cy="946440"/>
+          </a:xfrm>
+          <a:prstGeom prst="rect">
+            <a:avLst/>
+          </a:prstGeom>
+        </p:spPr>
+        <p:txBody>
+          <a:bodyPr lIns="0" rIns="0" tIns="0" bIns="0" anchor="ctr">
+            <a:noAutofit/>
+          </a:bodyPr>
+          <a:p>
+            <a:pPr algn="ctr"/>
+            <a:endParaRPr b="0" lang="en-US" sz="4400" spc="-1" strike="noStrike">
+              <a:latin typeface="Arial"/>
+            </a:endParaRPr>
+          </a:p>
+        </p:txBody>
+      </p:sp>
+      <p:sp>
+        <p:nvSpPr>
+          <p:cNvPr id="92" name="PlaceHolder 2"/>
+          <p:cNvSpPr>
+            <a:spLocks noGrp="1"/>
+          </p:cNvSpPr>
+          <p:nvPr>
+            <p:ph type="body"/>
+          </p:nvPr>
+        </p:nvSpPr>
+        <p:spPr>
+          <a:xfrm>
+            <a:off x="504000" y="1326600"/>
+            <a:ext cx="4426920" cy="3288600"/>
+          </a:xfrm>
+          <a:prstGeom prst="rect">
+            <a:avLst/>
+          </a:prstGeom>
+        </p:spPr>
+        <p:txBody>
+          <a:bodyPr lIns="0" rIns="0" tIns="0" bIns="0">
+            <a:normAutofit/>
+          </a:bodyPr>
+          <a:p>
+            <a:endParaRPr b="0" lang="en-US" sz="3200" spc="-1" strike="noStrike">
+              <a:latin typeface="Arial"/>
+            </a:endParaRPr>
+          </a:p>
+        </p:txBody>
+      </p:sp>
+      <p:sp>
+        <p:nvSpPr>
+          <p:cNvPr id="93" name="PlaceHolder 3"/>
+          <p:cNvSpPr>
+            <a:spLocks noGrp="1"/>
+          </p:cNvSpPr>
+          <p:nvPr>
+            <p:ph type="body"/>
+          </p:nvPr>
+        </p:nvSpPr>
+        <p:spPr>
+          <a:xfrm>
+            <a:off x="5152680" y="1326600"/>
+            <a:ext cx="4426920" cy="1568520"/>
+          </a:xfrm>
+          <a:prstGeom prst="rect">
+            <a:avLst/>
+          </a:prstGeom>
+        </p:spPr>
+        <p:txBody>
+          <a:bodyPr lIns="0" rIns="0" tIns="0" bIns="0">
+            <a:normAutofit/>
+          </a:bodyPr>
+          <a:p>
+            <a:endParaRPr b="0" lang="en-US" sz="3200" spc="-1" strike="noStrike">
+              <a:latin typeface="Arial"/>
+            </a:endParaRPr>
+          </a:p>
+        </p:txBody>
+      </p:sp>
+      <p:sp>
+        <p:nvSpPr>
+          <p:cNvPr id="94" name="PlaceHolder 4"/>
+          <p:cNvSpPr>
+            <a:spLocks noGrp="1"/>
+          </p:cNvSpPr>
+          <p:nvPr>
+            <p:ph type="body"/>
+          </p:nvPr>
+        </p:nvSpPr>
+        <p:spPr>
+          <a:xfrm>
+            <a:off x="5152680" y="3044520"/>
+            <a:ext cx="4426920" cy="1568520"/>
+          </a:xfrm>
+          <a:prstGeom prst="rect">
+            <a:avLst/>
+          </a:prstGeom>
+        </p:spPr>
+        <p:txBody>
+          <a:bodyPr lIns="0" rIns="0" tIns="0" bIns="0">
+            <a:normAutofit/>
+          </a:bodyPr>
+          <a:p>
+            <a:endParaRPr b="0" lang="en-US" sz="3200" spc="-1" strike="noStrike">
+              <a:latin typeface="Arial"/>
+            </a:endParaRPr>
+          </a:p>
+        </p:txBody>
+      </p:sp>
+    </p:spTree>
+  </p:cSld>
+</p:sldLayout>
+</file>
+
+<file path=ppt/slideLayouts/slideLayout33.xml><?xml version="1.0" encoding="utf-8"?>
+<p:sldLayout xmlns:a="http://schemas.openxmlformats.org/drawingml/2006/main" xmlns:p="http://schemas.openxmlformats.org/presentationml/2006/main" xmlns:r="http://schemas.openxmlformats.org/officeDocument/2006/relationships" xmlns:p14="http://schemas.microsoft.com/office/powerpoint/2010/main" xmlns:p15="http://schemas.microsoft.com/office/powerpoint/2012/main" xmlns:mc="http://schemas.openxmlformats.org/markup-compatibility/2006" type="twoObjOverTx" preserve="1">
+  <p:cSld name="Title, 2 Content over Content">
+    <p:spTree>
+      <p:nvGrpSpPr>
+        <p:cNvPr id="1" name=""/>
+        <p:cNvGrpSpPr/>
+        <p:nvPr/>
+      </p:nvGrpSpPr>
+      <p:grpSpPr>
+        <a:xfrm>
+          <a:off x="0" y="0"/>
+          <a:ext cx="0" cy="0"/>
+          <a:chOff x="0" y="0"/>
+          <a:chExt cx="0" cy="0"/>
+        </a:xfrm>
+      </p:grpSpPr>
+      <p:sp>
+        <p:nvSpPr>
+          <p:cNvPr id="95" name="PlaceHolder 1"/>
+          <p:cNvSpPr>
+            <a:spLocks noGrp="1"/>
+          </p:cNvSpPr>
+          <p:nvPr>
+            <p:ph type="title"/>
+          </p:nvPr>
+        </p:nvSpPr>
+        <p:spPr>
+          <a:xfrm>
+            <a:off x="504000" y="226080"/>
+            <a:ext cx="9072000" cy="946440"/>
+          </a:xfrm>
+          <a:prstGeom prst="rect">
+            <a:avLst/>
+          </a:prstGeom>
+        </p:spPr>
+        <p:txBody>
+          <a:bodyPr lIns="0" rIns="0" tIns="0" bIns="0" anchor="ctr">
+            <a:noAutofit/>
+          </a:bodyPr>
+          <a:p>
+            <a:pPr algn="ctr"/>
+            <a:endParaRPr b="0" lang="en-US" sz="4400" spc="-1" strike="noStrike">
+              <a:latin typeface="Arial"/>
+            </a:endParaRPr>
+          </a:p>
+        </p:txBody>
+      </p:sp>
+      <p:sp>
+        <p:nvSpPr>
+          <p:cNvPr id="96" name="PlaceHolder 2"/>
+          <p:cNvSpPr>
+            <a:spLocks noGrp="1"/>
+          </p:cNvSpPr>
+          <p:nvPr>
+            <p:ph type="body"/>
+          </p:nvPr>
+        </p:nvSpPr>
+        <p:spPr>
+          <a:xfrm>
+            <a:off x="504000" y="1326600"/>
+            <a:ext cx="4426920" cy="1568520"/>
+          </a:xfrm>
+          <a:prstGeom prst="rect">
+            <a:avLst/>
+          </a:prstGeom>
+        </p:spPr>
+        <p:txBody>
+          <a:bodyPr lIns="0" rIns="0" tIns="0" bIns="0">
+            <a:normAutofit/>
+          </a:bodyPr>
+          <a:p>
+            <a:endParaRPr b="0" lang="en-US" sz="3200" spc="-1" strike="noStrike">
+              <a:latin typeface="Arial"/>
+            </a:endParaRPr>
+          </a:p>
+        </p:txBody>
+      </p:sp>
+      <p:sp>
+        <p:nvSpPr>
+          <p:cNvPr id="97" name="PlaceHolder 3"/>
+          <p:cNvSpPr>
+            <a:spLocks noGrp="1"/>
+          </p:cNvSpPr>
+          <p:nvPr>
+            <p:ph type="body"/>
+          </p:nvPr>
+        </p:nvSpPr>
+        <p:spPr>
+          <a:xfrm>
+            <a:off x="5152680" y="1326600"/>
+            <a:ext cx="4426920" cy="1568520"/>
+          </a:xfrm>
+          <a:prstGeom prst="rect">
+            <a:avLst/>
+          </a:prstGeom>
+        </p:spPr>
+        <p:txBody>
+          <a:bodyPr lIns="0" rIns="0" tIns="0" bIns="0">
+            <a:normAutofit/>
+          </a:bodyPr>
+          <a:p>
+            <a:endParaRPr b="0" lang="en-US" sz="3200" spc="-1" strike="noStrike">
+              <a:latin typeface="Arial"/>
+            </a:endParaRPr>
+          </a:p>
+        </p:txBody>
+      </p:sp>
+      <p:sp>
+        <p:nvSpPr>
+          <p:cNvPr id="98" name="PlaceHolder 4"/>
+          <p:cNvSpPr>
+            <a:spLocks noGrp="1"/>
+          </p:cNvSpPr>
+          <p:nvPr>
+            <p:ph type="body"/>
+          </p:nvPr>
+        </p:nvSpPr>
+        <p:spPr>
+          <a:xfrm>
+            <a:off x="504000" y="3044520"/>
+            <a:ext cx="9072000" cy="1568520"/>
+          </a:xfrm>
+          <a:prstGeom prst="rect">
+            <a:avLst/>
+          </a:prstGeom>
+        </p:spPr>
+        <p:txBody>
+          <a:bodyPr lIns="0" rIns="0" tIns="0" bIns="0">
+            <a:normAutofit/>
+          </a:bodyPr>
+          <a:p>
+            <a:endParaRPr b="0" lang="en-US" sz="3200" spc="-1" strike="noStrike">
+              <a:latin typeface="Arial"/>
+            </a:endParaRPr>
+          </a:p>
+        </p:txBody>
+      </p:sp>
+    </p:spTree>
+  </p:cSld>
+</p:sldLayout>
+</file>
+
+<file path=ppt/slideLayouts/slideLayout34.xml><?xml version="1.0" encoding="utf-8"?>
+<p:sldLayout xmlns:a="http://schemas.openxmlformats.org/drawingml/2006/main" xmlns:p="http://schemas.openxmlformats.org/presentationml/2006/main" xmlns:r="http://schemas.openxmlformats.org/officeDocument/2006/relationships" xmlns:p14="http://schemas.microsoft.com/office/powerpoint/2010/main" xmlns:p15="http://schemas.microsoft.com/office/powerpoint/2012/main" xmlns:mc="http://schemas.openxmlformats.org/markup-compatibility/2006" type="objOverTx" preserve="1">
+  <p:cSld name="Title, Content over Content">
+    <p:spTree>
+      <p:nvGrpSpPr>
+        <p:cNvPr id="1" name=""/>
+        <p:cNvGrpSpPr/>
+        <p:nvPr/>
+      </p:nvGrpSpPr>
+      <p:grpSpPr>
+        <a:xfrm>
+          <a:off x="0" y="0"/>
+          <a:ext cx="0" cy="0"/>
+          <a:chOff x="0" y="0"/>
+          <a:chExt cx="0" cy="0"/>
+        </a:xfrm>
+      </p:grpSpPr>
+      <p:sp>
+        <p:nvSpPr>
+          <p:cNvPr id="99" name="PlaceHolder 1"/>
+          <p:cNvSpPr>
+            <a:spLocks noGrp="1"/>
+          </p:cNvSpPr>
+          <p:nvPr>
+            <p:ph type="title"/>
+          </p:nvPr>
+        </p:nvSpPr>
+        <p:spPr>
+          <a:xfrm>
+            <a:off x="504000" y="226080"/>
+            <a:ext cx="9072000" cy="946440"/>
+          </a:xfrm>
+          <a:prstGeom prst="rect">
+            <a:avLst/>
+          </a:prstGeom>
+        </p:spPr>
+        <p:txBody>
+          <a:bodyPr lIns="0" rIns="0" tIns="0" bIns="0" anchor="ctr">
+            <a:noAutofit/>
+          </a:bodyPr>
+          <a:p>
+            <a:pPr algn="ctr"/>
+            <a:endParaRPr b="0" lang="en-US" sz="4400" spc="-1" strike="noStrike">
+              <a:latin typeface="Arial"/>
+            </a:endParaRPr>
+          </a:p>
+        </p:txBody>
+      </p:sp>
+      <p:sp>
+        <p:nvSpPr>
+          <p:cNvPr id="100" name="PlaceHolder 2"/>
+          <p:cNvSpPr>
+            <a:spLocks noGrp="1"/>
+          </p:cNvSpPr>
+          <p:nvPr>
+            <p:ph type="body"/>
+          </p:nvPr>
+        </p:nvSpPr>
+        <p:spPr>
+          <a:xfrm>
+            <a:off x="504000" y="1326600"/>
+            <a:ext cx="9072000" cy="1568520"/>
+          </a:xfrm>
+          <a:prstGeom prst="rect">
+            <a:avLst/>
+          </a:prstGeom>
+        </p:spPr>
+        <p:txBody>
+          <a:bodyPr lIns="0" rIns="0" tIns="0" bIns="0">
+            <a:normAutofit/>
+          </a:bodyPr>
+          <a:p>
+            <a:endParaRPr b="0" lang="en-US" sz="3200" spc="-1" strike="noStrike">
+              <a:latin typeface="Arial"/>
+            </a:endParaRPr>
+          </a:p>
+        </p:txBody>
+      </p:sp>
+      <p:sp>
+        <p:nvSpPr>
+          <p:cNvPr id="101" name="PlaceHolder 3"/>
+          <p:cNvSpPr>
+            <a:spLocks noGrp="1"/>
+          </p:cNvSpPr>
+          <p:nvPr>
+            <p:ph type="body"/>
+          </p:nvPr>
+        </p:nvSpPr>
+        <p:spPr>
+          <a:xfrm>
+            <a:off x="504000" y="3044520"/>
+            <a:ext cx="9072000" cy="1568520"/>
+          </a:xfrm>
+          <a:prstGeom prst="rect">
+            <a:avLst/>
+          </a:prstGeom>
+        </p:spPr>
+        <p:txBody>
+          <a:bodyPr lIns="0" rIns="0" tIns="0" bIns="0">
+            <a:normAutofit/>
+          </a:bodyPr>
+          <a:p>
+            <a:endParaRPr b="0" lang="en-US" sz="3200" spc="-1" strike="noStrike">
+              <a:latin typeface="Arial"/>
+            </a:endParaRPr>
+          </a:p>
+        </p:txBody>
+      </p:sp>
+    </p:spTree>
+  </p:cSld>
+</p:sldLayout>
+</file>
+
+<file path=ppt/slideLayouts/slideLayout35.xml><?xml version="1.0" encoding="utf-8"?>
+<p:sldLayout xmlns:a="http://schemas.openxmlformats.org/drawingml/2006/main" xmlns:p="http://schemas.openxmlformats.org/presentationml/2006/main" xmlns:r="http://schemas.openxmlformats.org/officeDocument/2006/relationships" xmlns:p14="http://schemas.microsoft.com/office/powerpoint/2010/main" xmlns:p15="http://schemas.microsoft.com/office/powerpoint/2012/main" xmlns:mc="http://schemas.openxmlformats.org/markup-compatibility/2006" type="fourObj" preserve="1">
+  <p:cSld name="Title, 4 Content">
+    <p:spTree>
+      <p:nvGrpSpPr>
+        <p:cNvPr id="1" name=""/>
+        <p:cNvGrpSpPr/>
+        <p:nvPr/>
+      </p:nvGrpSpPr>
+      <p:grpSpPr>
+        <a:xfrm>
+          <a:off x="0" y="0"/>
+          <a:ext cx="0" cy="0"/>
+          <a:chOff x="0" y="0"/>
+          <a:chExt cx="0" cy="0"/>
+        </a:xfrm>
+      </p:grpSpPr>
+      <p:sp>
+        <p:nvSpPr>
+          <p:cNvPr id="102" name="PlaceHolder 1"/>
+          <p:cNvSpPr>
+            <a:spLocks noGrp="1"/>
+          </p:cNvSpPr>
+          <p:nvPr>
+            <p:ph type="title"/>
+          </p:nvPr>
+        </p:nvSpPr>
+        <p:spPr>
+          <a:xfrm>
+            <a:off x="504000" y="226080"/>
+            <a:ext cx="9072000" cy="946440"/>
+          </a:xfrm>
+          <a:prstGeom prst="rect">
+            <a:avLst/>
+          </a:prstGeom>
+        </p:spPr>
+        <p:txBody>
+          <a:bodyPr lIns="0" rIns="0" tIns="0" bIns="0" anchor="ctr">
+            <a:noAutofit/>
+          </a:bodyPr>
+          <a:p>
+            <a:pPr algn="ctr"/>
+            <a:endParaRPr b="0" lang="en-US" sz="4400" spc="-1" strike="noStrike">
+              <a:latin typeface="Arial"/>
+            </a:endParaRPr>
+          </a:p>
+        </p:txBody>
+      </p:sp>
+      <p:sp>
+        <p:nvSpPr>
+          <p:cNvPr id="103" name="PlaceHolder 2"/>
+          <p:cNvSpPr>
+            <a:spLocks noGrp="1"/>
+          </p:cNvSpPr>
+          <p:nvPr>
+            <p:ph type="body"/>
+          </p:nvPr>
+        </p:nvSpPr>
+        <p:spPr>
+          <a:xfrm>
+            <a:off x="504000" y="1326600"/>
+            <a:ext cx="4426920" cy="1568520"/>
+          </a:xfrm>
+          <a:prstGeom prst="rect">
+            <a:avLst/>
+          </a:prstGeom>
+        </p:spPr>
+        <p:txBody>
+          <a:bodyPr lIns="0" rIns="0" tIns="0" bIns="0">
+            <a:normAutofit/>
+          </a:bodyPr>
+          <a:p>
+            <a:endParaRPr b="0" lang="en-US" sz="3200" spc="-1" strike="noStrike">
+              <a:latin typeface="Arial"/>
+            </a:endParaRPr>
+          </a:p>
+        </p:txBody>
+      </p:sp>
+      <p:sp>
+        <p:nvSpPr>
+          <p:cNvPr id="104" name="PlaceHolder 3"/>
+          <p:cNvSpPr>
+            <a:spLocks noGrp="1"/>
+          </p:cNvSpPr>
+          <p:nvPr>
+            <p:ph type="body"/>
+          </p:nvPr>
+        </p:nvSpPr>
+        <p:spPr>
+          <a:xfrm>
+            <a:off x="5152680" y="1326600"/>
+            <a:ext cx="4426920" cy="1568520"/>
+          </a:xfrm>
+          <a:prstGeom prst="rect">
+            <a:avLst/>
+          </a:prstGeom>
+        </p:spPr>
+        <p:txBody>
+          <a:bodyPr lIns="0" rIns="0" tIns="0" bIns="0">
+            <a:normAutofit/>
+          </a:bodyPr>
+          <a:p>
+            <a:endParaRPr b="0" lang="en-US" sz="3200" spc="-1" strike="noStrike">
+              <a:latin typeface="Arial"/>
+            </a:endParaRPr>
+          </a:p>
+        </p:txBody>
+      </p:sp>
+      <p:sp>
+        <p:nvSpPr>
+          <p:cNvPr id="105" name="PlaceHolder 4"/>
+          <p:cNvSpPr>
+            <a:spLocks noGrp="1"/>
+          </p:cNvSpPr>
+          <p:nvPr>
+            <p:ph type="body"/>
+          </p:nvPr>
+        </p:nvSpPr>
+        <p:spPr>
+          <a:xfrm>
+            <a:off x="504000" y="3044520"/>
+            <a:ext cx="4426920" cy="1568520"/>
+          </a:xfrm>
+          <a:prstGeom prst="rect">
+            <a:avLst/>
+          </a:prstGeom>
+        </p:spPr>
+        <p:txBody>
+          <a:bodyPr lIns="0" rIns="0" tIns="0" bIns="0">
+            <a:normAutofit/>
+          </a:bodyPr>
+          <a:p>
+            <a:endParaRPr b="0" lang="en-US" sz="3200" spc="-1" strike="noStrike">
+              <a:latin typeface="Arial"/>
+            </a:endParaRPr>
+          </a:p>
+        </p:txBody>
+      </p:sp>
+      <p:sp>
+        <p:nvSpPr>
+          <p:cNvPr id="106" name="PlaceHolder 5"/>
+          <p:cNvSpPr>
+            <a:spLocks noGrp="1"/>
+          </p:cNvSpPr>
+          <p:nvPr>
+            <p:ph type="body"/>
+          </p:nvPr>
+        </p:nvSpPr>
+        <p:spPr>
+          <a:xfrm>
+            <a:off x="5152680" y="3044520"/>
+            <a:ext cx="4426920" cy="1568520"/>
+          </a:xfrm>
+          <a:prstGeom prst="rect">
+            <a:avLst/>
+          </a:prstGeom>
+        </p:spPr>
+        <p:txBody>
+          <a:bodyPr lIns="0" rIns="0" tIns="0" bIns="0">
+            <a:normAutofit/>
+          </a:bodyPr>
+          <a:p>
+            <a:endParaRPr b="0" lang="en-US" sz="3200" spc="-1" strike="noStrike">
+              <a:latin typeface="Arial"/>
+            </a:endParaRPr>
+          </a:p>
+        </p:txBody>
+      </p:sp>
+    </p:spTree>
+  </p:cSld>
+</p:sldLayout>
+</file>
+
+<file path=ppt/slideLayouts/slideLayout36.xml><?xml version="1.0" encoding="utf-8"?>
+<p:sldLayout xmlns:a="http://schemas.openxmlformats.org/drawingml/2006/main" xmlns:p="http://schemas.openxmlformats.org/presentationml/2006/main" xmlns:r="http://schemas.openxmlformats.org/officeDocument/2006/relationships" xmlns:p14="http://schemas.microsoft.com/office/powerpoint/2010/main" xmlns:p15="http://schemas.microsoft.com/office/powerpoint/2012/main" xmlns:mc="http://schemas.openxmlformats.org/markup-compatibility/2006" type="blank" preserve="1">
+  <p:cSld name="Title, 6 Content">
+    <p:spTree>
+      <p:nvGrpSpPr>
+        <p:cNvPr id="1" name=""/>
+        <p:cNvGrpSpPr/>
+        <p:nvPr/>
+      </p:nvGrpSpPr>
+      <p:grpSpPr>
+        <a:xfrm>
+          <a:off x="0" y="0"/>
+          <a:ext cx="0" cy="0"/>
+          <a:chOff x="0" y="0"/>
+          <a:chExt cx="0" cy="0"/>
+        </a:xfrm>
+      </p:grpSpPr>
+      <p:sp>
+        <p:nvSpPr>
+          <p:cNvPr id="107" name="PlaceHolder 1"/>
+          <p:cNvSpPr>
+            <a:spLocks noGrp="1"/>
+          </p:cNvSpPr>
+          <p:nvPr>
+            <p:ph type="title"/>
+          </p:nvPr>
+        </p:nvSpPr>
+        <p:spPr>
+          <a:xfrm>
+            <a:off x="504000" y="226080"/>
+            <a:ext cx="9072000" cy="946440"/>
+          </a:xfrm>
+          <a:prstGeom prst="rect">
+            <a:avLst/>
+          </a:prstGeom>
+        </p:spPr>
+        <p:txBody>
+          <a:bodyPr lIns="0" rIns="0" tIns="0" bIns="0" anchor="ctr">
+            <a:noAutofit/>
+          </a:bodyPr>
+          <a:p>
+            <a:pPr algn="ctr"/>
+            <a:endParaRPr b="0" lang="en-US" sz="4400" spc="-1" strike="noStrike">
+              <a:latin typeface="Arial"/>
+            </a:endParaRPr>
+          </a:p>
+        </p:txBody>
+      </p:sp>
+      <p:sp>
+        <p:nvSpPr>
+          <p:cNvPr id="108" name="PlaceHolder 2"/>
+          <p:cNvSpPr>
+            <a:spLocks noGrp="1"/>
+          </p:cNvSpPr>
+          <p:nvPr>
+            <p:ph type="body"/>
+          </p:nvPr>
+        </p:nvSpPr>
+        <p:spPr>
+          <a:xfrm>
+            <a:off x="504000" y="1326600"/>
+            <a:ext cx="2921040" cy="1568520"/>
+          </a:xfrm>
+          <a:prstGeom prst="rect">
+            <a:avLst/>
+          </a:prstGeom>
+        </p:spPr>
+        <p:txBody>
+          <a:bodyPr lIns="0" rIns="0" tIns="0" bIns="0">
+            <a:normAutofit/>
+          </a:bodyPr>
+          <a:p>
+            <a:endParaRPr b="0" lang="en-US" sz="3200" spc="-1" strike="noStrike">
+              <a:latin typeface="Arial"/>
+            </a:endParaRPr>
+          </a:p>
+        </p:txBody>
+      </p:sp>
+      <p:sp>
+        <p:nvSpPr>
+          <p:cNvPr id="109" name="PlaceHolder 3"/>
+          <p:cNvSpPr>
+            <a:spLocks noGrp="1"/>
+          </p:cNvSpPr>
+          <p:nvPr>
+            <p:ph type="body"/>
+          </p:nvPr>
+        </p:nvSpPr>
+        <p:spPr>
+          <a:xfrm>
+            <a:off x="3571560" y="1326600"/>
+            <a:ext cx="2921040" cy="1568520"/>
+          </a:xfrm>
+          <a:prstGeom prst="rect">
+            <a:avLst/>
+          </a:prstGeom>
+        </p:spPr>
+        <p:txBody>
+          <a:bodyPr lIns="0" rIns="0" tIns="0" bIns="0">
+            <a:normAutofit/>
+          </a:bodyPr>
+          <a:p>
+            <a:endParaRPr b="0" lang="en-US" sz="3200" spc="-1" strike="noStrike">
+              <a:latin typeface="Arial"/>
+            </a:endParaRPr>
+          </a:p>
+        </p:txBody>
+      </p:sp>
+      <p:sp>
+        <p:nvSpPr>
+          <p:cNvPr id="110" name="PlaceHolder 4"/>
+          <p:cNvSpPr>
+            <a:spLocks noGrp="1"/>
+          </p:cNvSpPr>
+          <p:nvPr>
+            <p:ph type="body"/>
+          </p:nvPr>
+        </p:nvSpPr>
+        <p:spPr>
+          <a:xfrm>
+            <a:off x="6639120" y="1326600"/>
+            <a:ext cx="2921040" cy="1568520"/>
+          </a:xfrm>
+          <a:prstGeom prst="rect">
+            <a:avLst/>
+          </a:prstGeom>
+        </p:spPr>
+        <p:txBody>
+          <a:bodyPr lIns="0" rIns="0" tIns="0" bIns="0">
+            <a:normAutofit/>
+          </a:bodyPr>
+          <a:p>
+            <a:endParaRPr b="0" lang="en-US" sz="3200" spc="-1" strike="noStrike">
+              <a:latin typeface="Arial"/>
+            </a:endParaRPr>
+          </a:p>
+        </p:txBody>
+      </p:sp>
+      <p:sp>
+        <p:nvSpPr>
+          <p:cNvPr id="111" name="PlaceHolder 5"/>
+          <p:cNvSpPr>
+            <a:spLocks noGrp="1"/>
+          </p:cNvSpPr>
+          <p:nvPr>
+            <p:ph type="body"/>
+          </p:nvPr>
+        </p:nvSpPr>
+        <p:spPr>
+          <a:xfrm>
+            <a:off x="504000" y="3044520"/>
+            <a:ext cx="2921040" cy="1568520"/>
+          </a:xfrm>
+          <a:prstGeom prst="rect">
+            <a:avLst/>
+          </a:prstGeom>
+        </p:spPr>
+        <p:txBody>
+          <a:bodyPr lIns="0" rIns="0" tIns="0" bIns="0">
+            <a:normAutofit/>
+          </a:bodyPr>
+          <a:p>
+            <a:endParaRPr b="0" lang="en-US" sz="3200" spc="-1" strike="noStrike">
+              <a:latin typeface="Arial"/>
+            </a:endParaRPr>
+          </a:p>
+        </p:txBody>
+      </p:sp>
+      <p:sp>
+        <p:nvSpPr>
+          <p:cNvPr id="112" name="PlaceHolder 6"/>
+          <p:cNvSpPr>
+            <a:spLocks noGrp="1"/>
+          </p:cNvSpPr>
+          <p:nvPr>
+            <p:ph type="body"/>
+          </p:nvPr>
+        </p:nvSpPr>
+        <p:spPr>
+          <a:xfrm>
+            <a:off x="3571560" y="3044520"/>
+            <a:ext cx="2921040" cy="1568520"/>
+          </a:xfrm>
+          <a:prstGeom prst="rect">
+            <a:avLst/>
+          </a:prstGeom>
+        </p:spPr>
+        <p:txBody>
+          <a:bodyPr lIns="0" rIns="0" tIns="0" bIns="0">
+            <a:normAutofit/>
+          </a:bodyPr>
+          <a:p>
+            <a:endParaRPr b="0" lang="en-US" sz="3200" spc="-1" strike="noStrike">
+              <a:latin typeface="Arial"/>
+            </a:endParaRPr>
+          </a:p>
+        </p:txBody>
+      </p:sp>
+      <p:sp>
+        <p:nvSpPr>
+          <p:cNvPr id="113" name="PlaceHolder 7"/>
+          <p:cNvSpPr>
+            <a:spLocks noGrp="1"/>
+          </p:cNvSpPr>
+          <p:nvPr>
+            <p:ph type="body"/>
+          </p:nvPr>
+        </p:nvSpPr>
+        <p:spPr>
+          <a:xfrm>
+            <a:off x="6639120" y="3044520"/>
+            <a:ext cx="2921040" cy="1568520"/>
           </a:xfrm>
           <a:prstGeom prst="rect">
             <a:avLst/>
@@ -2119,7 +3476,7 @@
         <p:spPr>
           <a:xfrm>
             <a:off x="504000" y="226080"/>
-            <a:ext cx="9070920" cy="945720"/>
+            <a:ext cx="9072000" cy="946440"/>
           </a:xfrm>
           <a:prstGeom prst="rect">
             <a:avLst/>
@@ -2150,7 +3507,7 @@
         <p:spPr>
           <a:xfrm>
             <a:off x="504000" y="1326600"/>
-            <a:ext cx="4426920" cy="3288240"/>
+            <a:ext cx="4426920" cy="3288600"/>
           </a:xfrm>
           <a:prstGeom prst="rect">
             <a:avLst/>
@@ -2180,7 +3537,7 @@
         <p:spPr>
           <a:xfrm>
             <a:off x="5152680" y="1326600"/>
-            <a:ext cx="4426920" cy="3288240"/>
+            <a:ext cx="4426920" cy="3288600"/>
           </a:xfrm>
           <a:prstGeom prst="rect">
             <a:avLst/>
@@ -2232,7 +3589,7 @@
         <p:spPr>
           <a:xfrm>
             <a:off x="504000" y="226080"/>
-            <a:ext cx="9070920" cy="945720"/>
+            <a:ext cx="9072000" cy="946440"/>
           </a:xfrm>
           <a:prstGeom prst="rect">
             <a:avLst/>
@@ -2285,7 +3642,7 @@
         <p:spPr>
           <a:xfrm>
             <a:off x="504000" y="226080"/>
-            <a:ext cx="9070920" cy="4385160"/>
+            <a:ext cx="9072000" cy="4388400"/>
           </a:xfrm>
           <a:prstGeom prst="rect">
             <a:avLst/>
@@ -2338,7 +3695,7 @@
         <p:spPr>
           <a:xfrm>
             <a:off x="504000" y="226080"/>
-            <a:ext cx="9070920" cy="945720"/>
+            <a:ext cx="9072000" cy="946440"/>
           </a:xfrm>
           <a:prstGeom prst="rect">
             <a:avLst/>
@@ -2369,7 +3726,7 @@
         <p:spPr>
           <a:xfrm>
             <a:off x="504000" y="1326600"/>
-            <a:ext cx="4426920" cy="1568160"/>
+            <a:ext cx="4426920" cy="1568520"/>
           </a:xfrm>
           <a:prstGeom prst="rect">
             <a:avLst/>
@@ -2399,7 +3756,7 @@
         <p:spPr>
           <a:xfrm>
             <a:off x="5152680" y="1326600"/>
-            <a:ext cx="4426920" cy="3288240"/>
+            <a:ext cx="4426920" cy="3288600"/>
           </a:xfrm>
           <a:prstGeom prst="rect">
             <a:avLst/>
@@ -2428,8 +3785,8 @@
         </p:nvSpPr>
         <p:spPr>
           <a:xfrm>
-            <a:off x="504000" y="3044160"/>
-            <a:ext cx="4426920" cy="1568160"/>
+            <a:off x="504000" y="3044520"/>
+            <a:ext cx="4426920" cy="1568520"/>
           </a:xfrm>
           <a:prstGeom prst="rect">
             <a:avLst/>
@@ -2481,7 +3838,7 @@
         <p:spPr>
           <a:xfrm>
             <a:off x="504000" y="226080"/>
-            <a:ext cx="9070920" cy="945720"/>
+            <a:ext cx="9072000" cy="946440"/>
           </a:xfrm>
           <a:prstGeom prst="rect">
             <a:avLst/>
@@ -2512,7 +3869,7 @@
         <p:spPr>
           <a:xfrm>
             <a:off x="504000" y="1326600"/>
-            <a:ext cx="4426920" cy="3288240"/>
+            <a:ext cx="4426920" cy="3288600"/>
           </a:xfrm>
           <a:prstGeom prst="rect">
             <a:avLst/>
@@ -2542,7 +3899,7 @@
         <p:spPr>
           <a:xfrm>
             <a:off x="5152680" y="1326600"/>
-            <a:ext cx="4426920" cy="1568160"/>
+            <a:ext cx="4426920" cy="1568520"/>
           </a:xfrm>
           <a:prstGeom prst="rect">
             <a:avLst/>
@@ -2571,8 +3928,8 @@
         </p:nvSpPr>
         <p:spPr>
           <a:xfrm>
-            <a:off x="5152680" y="3044160"/>
-            <a:ext cx="4426920" cy="1568160"/>
+            <a:off x="5152680" y="3044520"/>
+            <a:ext cx="4426920" cy="1568520"/>
           </a:xfrm>
           <a:prstGeom prst="rect">
             <a:avLst/>
@@ -2624,7 +3981,7 @@
         <p:spPr>
           <a:xfrm>
             <a:off x="504000" y="226080"/>
-            <a:ext cx="9070920" cy="945720"/>
+            <a:ext cx="9072000" cy="946440"/>
           </a:xfrm>
           <a:prstGeom prst="rect">
             <a:avLst/>
@@ -2655,7 +4012,7 @@
         <p:spPr>
           <a:xfrm>
             <a:off x="504000" y="1326600"/>
-            <a:ext cx="4426920" cy="1568160"/>
+            <a:ext cx="4426920" cy="1568520"/>
           </a:xfrm>
           <a:prstGeom prst="rect">
             <a:avLst/>
@@ -2685,7 +4042,7 @@
         <p:spPr>
           <a:xfrm>
             <a:off x="5152680" y="1326600"/>
-            <a:ext cx="4426920" cy="1568160"/>
+            <a:ext cx="4426920" cy="1568520"/>
           </a:xfrm>
           <a:prstGeom prst="rect">
             <a:avLst/>
@@ -2714,8 +4071,8 @@
         </p:nvSpPr>
         <p:spPr>
           <a:xfrm>
-            <a:off x="504000" y="3044160"/>
-            <a:ext cx="9071640" cy="1568160"/>
+            <a:off x="504000" y="3044520"/>
+            <a:ext cx="9072000" cy="1568520"/>
           </a:xfrm>
           <a:prstGeom prst="rect">
             <a:avLst/>
@@ -2767,7 +4124,7 @@
         <p:spPr>
           <a:xfrm>
             <a:off x="504000" y="226080"/>
-            <a:ext cx="9070920" cy="945720"/>
+            <a:ext cx="9072000" cy="946440"/>
           </a:xfrm>
           <a:prstGeom prst="rect">
             <a:avLst/>
@@ -2778,13 +4135,14 @@
             <a:noAutofit/>
           </a:bodyPr>
           <a:p>
-            <a:r>
-              <a:rPr b="0" lang="zh-CN" sz="1800" spc="-1" strike="noStrike">
+            <a:pPr algn="ctr"/>
+            <a:r>
+              <a:rPr b="0" lang="zh-CN" sz="4400" spc="-1" strike="noStrike">
                 <a:latin typeface="Arial"/>
               </a:rPr>
               <a:t>点击鼠标编辑标题文字格式</a:t>
             </a:r>
-            <a:endParaRPr b="0" lang="en-US" sz="1800" spc="-1" strike="noStrike">
+            <a:endParaRPr b="0" lang="en-US" sz="4400" spc="-1" strike="noStrike">
               <a:latin typeface="Arial"/>
             </a:endParaRPr>
           </a:p>
@@ -2803,7 +4161,7 @@
         <p:spPr>
           <a:xfrm>
             <a:off x="504000" y="1326600"/>
-            <a:ext cx="9071640" cy="3288240"/>
+            <a:ext cx="9072000" cy="3288600"/>
           </a:xfrm>
           <a:prstGeom prst="rect">
             <a:avLst/>
@@ -2811,7 +4169,7 @@
         </p:spPr>
         <p:txBody>
           <a:bodyPr lIns="0" rIns="0" tIns="0" bIns="0">
-            <a:normAutofit fontScale="91000"/>
+            <a:normAutofit/>
           </a:bodyPr>
           <a:p>
             <a:pPr marL="432000" indent="-324000">
@@ -2826,12 +4184,12 @@
               <a:buChar char=""/>
             </a:pPr>
             <a:r>
-              <a:rPr b="0" lang="zh-CN" sz="1800" spc="-1" strike="noStrike">
+              <a:rPr b="0" lang="zh-CN" sz="3200" spc="-1" strike="noStrike">
                 <a:latin typeface="Arial"/>
               </a:rPr>
               <a:t>点击鼠标编辑大纲文字格式</a:t>
             </a:r>
-            <a:endParaRPr b="0" lang="en-US" sz="1800" spc="-1" strike="noStrike">
+            <a:endParaRPr b="0" lang="en-US" sz="3200" spc="-1" strike="noStrike">
               <a:latin typeface="Arial"/>
             </a:endParaRPr>
           </a:p>
@@ -2848,12 +4206,12 @@
               <a:buChar char=""/>
             </a:pPr>
             <a:r>
-              <a:rPr b="0" lang="zh-CN" sz="1800" spc="-1" strike="noStrike">
+              <a:rPr b="0" lang="zh-CN" sz="2800" spc="-1" strike="noStrike">
                 <a:latin typeface="Arial"/>
               </a:rPr>
               <a:t>第二个大纲级</a:t>
             </a:r>
-            <a:endParaRPr b="0" lang="en-US" sz="1800" spc="-1" strike="noStrike">
+            <a:endParaRPr b="0" lang="en-US" sz="2800" spc="-1" strike="noStrike">
               <a:latin typeface="Arial"/>
             </a:endParaRPr>
           </a:p>
@@ -2870,12 +4228,12 @@
               <a:buChar char=""/>
             </a:pPr>
             <a:r>
-              <a:rPr b="0" lang="zh-CN" sz="1800" spc="-1" strike="noStrike">
+              <a:rPr b="0" lang="zh-CN" sz="2400" spc="-1" strike="noStrike">
                 <a:latin typeface="Arial"/>
               </a:rPr>
               <a:t>第三大纲级别</a:t>
             </a:r>
-            <a:endParaRPr b="0" lang="en-US" sz="1800" spc="-1" strike="noStrike">
+            <a:endParaRPr b="0" lang="en-US" sz="2400" spc="-1" strike="noStrike">
               <a:latin typeface="Arial"/>
             </a:endParaRPr>
           </a:p>
@@ -2892,12 +4250,12 @@
               <a:buChar char=""/>
             </a:pPr>
             <a:r>
-              <a:rPr b="0" lang="zh-CN" sz="1800" spc="-1" strike="noStrike">
+              <a:rPr b="0" lang="zh-CN" sz="2000" spc="-1" strike="noStrike">
                 <a:latin typeface="Arial"/>
               </a:rPr>
               <a:t>第四大纲级别</a:t>
             </a:r>
-            <a:endParaRPr b="0" lang="en-US" sz="1800" spc="-1" strike="noStrike">
+            <a:endParaRPr b="0" lang="en-US" sz="2000" spc="-1" strike="noStrike">
               <a:latin typeface="Arial"/>
             </a:endParaRPr>
           </a:p>
@@ -2914,12 +4272,12 @@
               <a:buChar char=""/>
             </a:pPr>
             <a:r>
-              <a:rPr b="0" lang="zh-CN" sz="1800" spc="-1" strike="noStrike">
+              <a:rPr b="0" lang="zh-CN" sz="2000" spc="-1" strike="noStrike">
                 <a:latin typeface="Arial"/>
               </a:rPr>
               <a:t>第五大纲级别</a:t>
             </a:r>
-            <a:endParaRPr b="0" lang="en-US" sz="1800" spc="-1" strike="noStrike">
+            <a:endParaRPr b="0" lang="en-US" sz="2000" spc="-1" strike="noStrike">
               <a:latin typeface="Arial"/>
             </a:endParaRPr>
           </a:p>
@@ -2936,12 +4294,12 @@
               <a:buChar char=""/>
             </a:pPr>
             <a:r>
-              <a:rPr b="0" lang="zh-CN" sz="1800" spc="-1" strike="noStrike">
+              <a:rPr b="0" lang="zh-CN" sz="2000" spc="-1" strike="noStrike">
                 <a:latin typeface="Arial"/>
               </a:rPr>
               <a:t>第六大纲级别</a:t>
             </a:r>
-            <a:endParaRPr b="0" lang="en-US" sz="1800" spc="-1" strike="noStrike">
+            <a:endParaRPr b="0" lang="en-US" sz="2000" spc="-1" strike="noStrike">
               <a:latin typeface="Arial"/>
             </a:endParaRPr>
           </a:p>
@@ -2958,12 +4316,12 @@
               <a:buChar char=""/>
             </a:pPr>
             <a:r>
-              <a:rPr b="0" lang="zh-CN" sz="1800" spc="-1" strike="noStrike">
+              <a:rPr b="0" lang="zh-CN" sz="2000" spc="-1" strike="noStrike">
                 <a:latin typeface="Arial"/>
               </a:rPr>
               <a:t>第七大纲级别</a:t>
             </a:r>
-            <a:endParaRPr b="0" lang="en-US" sz="1800" spc="-1" strike="noStrike">
+            <a:endParaRPr b="0" lang="en-US" sz="2000" spc="-1" strike="noStrike">
               <a:latin typeface="Arial"/>
             </a:endParaRPr>
           </a:p>
@@ -3035,13 +4393,7 @@
               <a:rPr b="0" lang="zh-CN" sz="4400" spc="-1" strike="noStrike">
                 <a:latin typeface="Arial"/>
               </a:rPr>
-              <a:t>点击鼠标编辑标题文字</a:t>
-            </a:r>
-            <a:r>
-              <a:rPr b="0" lang="zh-CN" sz="4400" spc="-1" strike="noStrike">
-                <a:latin typeface="Arial"/>
-              </a:rPr>
-              <a:t>格式</a:t>
+              <a:t>点击鼠标编辑标题文字格式</a:t>
             </a:r>
             <a:endParaRPr b="0" lang="en-US" sz="4400" spc="-1" strike="noStrike">
               <a:latin typeface="Arial"/>
@@ -3244,6 +4596,259 @@
     <p:sldLayoutId id="2147483671" r:id="rId11"/>
     <p:sldLayoutId id="2147483672" r:id="rId12"/>
     <p:sldLayoutId id="2147483673" r:id="rId13"/>
+  </p:sldLayoutIdLst>
+</p:sldMaster>
+</file>
+
+<file path=ppt/slideMasters/slideMaster3.xml><?xml version="1.0" encoding="utf-8"?>
+<p:sldMaster xmlns:a="http://schemas.openxmlformats.org/drawingml/2006/main" xmlns:p="http://schemas.openxmlformats.org/presentationml/2006/main" xmlns:r="http://schemas.openxmlformats.org/officeDocument/2006/relationships" xmlns:p14="http://schemas.microsoft.com/office/powerpoint/2010/main" xmlns:p15="http://schemas.microsoft.com/office/powerpoint/2012/main" xmlns:mc="http://schemas.openxmlformats.org/markup-compatibility/2006">
+  <p:cSld>
+    <p:spTree>
+      <p:nvGrpSpPr>
+        <p:cNvPr id="1" name=""/>
+        <p:cNvGrpSpPr/>
+        <p:nvPr/>
+      </p:nvGrpSpPr>
+      <p:grpSpPr>
+        <a:xfrm>
+          <a:off x="0" y="0"/>
+          <a:ext cx="0" cy="0"/>
+          <a:chOff x="0" y="0"/>
+          <a:chExt cx="0" cy="0"/>
+        </a:xfrm>
+      </p:grpSpPr>
+      <p:sp>
+        <p:nvSpPr>
+          <p:cNvPr id="76" name="PlaceHolder 1"/>
+          <p:cNvSpPr>
+            <a:spLocks noGrp="1"/>
+          </p:cNvSpPr>
+          <p:nvPr>
+            <p:ph type="title"/>
+          </p:nvPr>
+        </p:nvSpPr>
+        <p:spPr>
+          <a:xfrm>
+            <a:off x="504000" y="226080"/>
+            <a:ext cx="9072000" cy="946440"/>
+          </a:xfrm>
+          <a:prstGeom prst="rect">
+            <a:avLst/>
+          </a:prstGeom>
+        </p:spPr>
+        <p:txBody>
+          <a:bodyPr lIns="0" rIns="0" tIns="0" bIns="0" anchor="ctr">
+            <a:noAutofit/>
+          </a:bodyPr>
+          <a:p>
+            <a:pPr algn="ctr"/>
+            <a:r>
+              <a:rPr b="0" lang="zh-CN" sz="4400" spc="-1" strike="noStrike">
+                <a:latin typeface="Arial"/>
+              </a:rPr>
+              <a:t>点击鼠标编辑标题文字格式</a:t>
+            </a:r>
+            <a:endParaRPr b="0" lang="en-US" sz="4400" spc="-1" strike="noStrike">
+              <a:latin typeface="Arial"/>
+            </a:endParaRPr>
+          </a:p>
+        </p:txBody>
+      </p:sp>
+      <p:sp>
+        <p:nvSpPr>
+          <p:cNvPr id="77" name="PlaceHolder 2"/>
+          <p:cNvSpPr>
+            <a:spLocks noGrp="1"/>
+          </p:cNvSpPr>
+          <p:nvPr>
+            <p:ph type="body"/>
+          </p:nvPr>
+        </p:nvSpPr>
+        <p:spPr>
+          <a:xfrm>
+            <a:off x="504000" y="1326600"/>
+            <a:ext cx="9072000" cy="3288600"/>
+          </a:xfrm>
+          <a:prstGeom prst="rect">
+            <a:avLst/>
+          </a:prstGeom>
+        </p:spPr>
+        <p:txBody>
+          <a:bodyPr lIns="0" rIns="0" tIns="0" bIns="0">
+            <a:normAutofit fontScale="91000"/>
+          </a:bodyPr>
+          <a:p>
+            <a:pPr marL="432000" indent="-324000">
+              <a:spcBef>
+                <a:spcPts val="1417"/>
+              </a:spcBef>
+              <a:buClr>
+                <a:srgbClr val="000000"/>
+              </a:buClr>
+              <a:buSzPct val="45000"/>
+              <a:buFont typeface="Wingdings" charset="2"/>
+              <a:buChar char=""/>
+            </a:pPr>
+            <a:r>
+              <a:rPr b="0" lang="zh-CN" sz="3200" spc="-1" strike="noStrike">
+                <a:latin typeface="Arial"/>
+              </a:rPr>
+              <a:t>点击鼠标编辑大纲文字格式</a:t>
+            </a:r>
+            <a:endParaRPr b="0" lang="en-US" sz="3200" spc="-1" strike="noStrike">
+              <a:latin typeface="Arial"/>
+            </a:endParaRPr>
+          </a:p>
+          <a:p>
+            <a:pPr lvl="1" marL="864000" indent="-324000">
+              <a:spcBef>
+                <a:spcPts val="1134"/>
+              </a:spcBef>
+              <a:buClr>
+                <a:srgbClr val="000000"/>
+              </a:buClr>
+              <a:buSzPct val="75000"/>
+              <a:buFont typeface="Symbol" charset="2"/>
+              <a:buChar char=""/>
+            </a:pPr>
+            <a:r>
+              <a:rPr b="0" lang="zh-CN" sz="2800" spc="-1" strike="noStrike">
+                <a:latin typeface="Arial"/>
+              </a:rPr>
+              <a:t>第二个大纲级</a:t>
+            </a:r>
+            <a:endParaRPr b="0" lang="en-US" sz="2800" spc="-1" strike="noStrike">
+              <a:latin typeface="Arial"/>
+            </a:endParaRPr>
+          </a:p>
+          <a:p>
+            <a:pPr lvl="2" marL="1296000" indent="-288000">
+              <a:spcBef>
+                <a:spcPts val="850"/>
+              </a:spcBef>
+              <a:buClr>
+                <a:srgbClr val="000000"/>
+              </a:buClr>
+              <a:buSzPct val="45000"/>
+              <a:buFont typeface="Wingdings" charset="2"/>
+              <a:buChar char=""/>
+            </a:pPr>
+            <a:r>
+              <a:rPr b="0" lang="zh-CN" sz="2400" spc="-1" strike="noStrike">
+                <a:latin typeface="Arial"/>
+              </a:rPr>
+              <a:t>第三大纲级别</a:t>
+            </a:r>
+            <a:endParaRPr b="0" lang="en-US" sz="2400" spc="-1" strike="noStrike">
+              <a:latin typeface="Arial"/>
+            </a:endParaRPr>
+          </a:p>
+          <a:p>
+            <a:pPr lvl="3" marL="1728000" indent="-216000">
+              <a:spcBef>
+                <a:spcPts val="567"/>
+              </a:spcBef>
+              <a:buClr>
+                <a:srgbClr val="000000"/>
+              </a:buClr>
+              <a:buSzPct val="75000"/>
+              <a:buFont typeface="Symbol" charset="2"/>
+              <a:buChar char=""/>
+            </a:pPr>
+            <a:r>
+              <a:rPr b="0" lang="zh-CN" sz="2000" spc="-1" strike="noStrike">
+                <a:latin typeface="Arial"/>
+              </a:rPr>
+              <a:t>第四大纲级别</a:t>
+            </a:r>
+            <a:endParaRPr b="0" lang="en-US" sz="2000" spc="-1" strike="noStrike">
+              <a:latin typeface="Arial"/>
+            </a:endParaRPr>
+          </a:p>
+          <a:p>
+            <a:pPr lvl="4" marL="2160000" indent="-216000">
+              <a:spcBef>
+                <a:spcPts val="283"/>
+              </a:spcBef>
+              <a:buClr>
+                <a:srgbClr val="000000"/>
+              </a:buClr>
+              <a:buSzPct val="45000"/>
+              <a:buFont typeface="Wingdings" charset="2"/>
+              <a:buChar char=""/>
+            </a:pPr>
+            <a:r>
+              <a:rPr b="0" lang="zh-CN" sz="2000" spc="-1" strike="noStrike">
+                <a:latin typeface="Arial"/>
+              </a:rPr>
+              <a:t>第五大纲级别</a:t>
+            </a:r>
+            <a:endParaRPr b="0" lang="en-US" sz="2000" spc="-1" strike="noStrike">
+              <a:latin typeface="Arial"/>
+            </a:endParaRPr>
+          </a:p>
+          <a:p>
+            <a:pPr lvl="5" marL="2592000" indent="-216000">
+              <a:spcBef>
+                <a:spcPts val="283"/>
+              </a:spcBef>
+              <a:buClr>
+                <a:srgbClr val="000000"/>
+              </a:buClr>
+              <a:buSzPct val="45000"/>
+              <a:buFont typeface="Wingdings" charset="2"/>
+              <a:buChar char=""/>
+            </a:pPr>
+            <a:r>
+              <a:rPr b="0" lang="zh-CN" sz="2000" spc="-1" strike="noStrike">
+                <a:latin typeface="Arial"/>
+              </a:rPr>
+              <a:t>第六大纲级别</a:t>
+            </a:r>
+            <a:endParaRPr b="0" lang="en-US" sz="2000" spc="-1" strike="noStrike">
+              <a:latin typeface="Arial"/>
+            </a:endParaRPr>
+          </a:p>
+          <a:p>
+            <a:pPr lvl="6" marL="3024000" indent="-216000">
+              <a:spcBef>
+                <a:spcPts val="283"/>
+              </a:spcBef>
+              <a:buClr>
+                <a:srgbClr val="000000"/>
+              </a:buClr>
+              <a:buSzPct val="45000"/>
+              <a:buFont typeface="Wingdings" charset="2"/>
+              <a:buChar char=""/>
+            </a:pPr>
+            <a:r>
+              <a:rPr b="0" lang="zh-CN" sz="2000" spc="-1" strike="noStrike">
+                <a:latin typeface="Arial"/>
+              </a:rPr>
+              <a:t>第七大纲级别</a:t>
+            </a:r>
+            <a:endParaRPr b="0" lang="en-US" sz="2000" spc="-1" strike="noStrike">
+              <a:latin typeface="Arial"/>
+            </a:endParaRPr>
+          </a:p>
+        </p:txBody>
+      </p:sp>
+    </p:spTree>
+  </p:cSld>
+  <p:clrMap bg1="lt1" bg2="lt2" tx1="dk1" tx2="dk2" accent1="accent1" accent2="accent2" accent3="accent3" accent4="accent4" accent5="accent5" accent6="accent6" hlink="hlink" folHlink="folHlink"/>
+  <p:sldLayoutIdLst>
+    <p:sldLayoutId id="2147483675" r:id="rId2"/>
+    <p:sldLayoutId id="2147483676" r:id="rId3"/>
+    <p:sldLayoutId id="2147483677" r:id="rId4"/>
+    <p:sldLayoutId id="2147483678" r:id="rId5"/>
+    <p:sldLayoutId id="2147483679" r:id="rId6"/>
+    <p:sldLayoutId id="2147483680" r:id="rId7"/>
+    <p:sldLayoutId id="2147483681" r:id="rId8"/>
+    <p:sldLayoutId id="2147483682" r:id="rId9"/>
+    <p:sldLayoutId id="2147483683" r:id="rId10"/>
+    <p:sldLayoutId id="2147483684" r:id="rId11"/>
+    <p:sldLayoutId id="2147483685" r:id="rId12"/>
+    <p:sldLayoutId id="2147483686" r:id="rId13"/>
   </p:sldLayoutIdLst>
 </p:sldMaster>
 </file>
@@ -3267,14 +4872,14 @@
       </p:grpSpPr>
       <p:sp>
         <p:nvSpPr>
-          <p:cNvPr id="76" name="CustomShape 1"/>
+          <p:cNvPr id="114" name="CustomShape 1"/>
           <p:cNvSpPr/>
           <p:nvPr/>
         </p:nvSpPr>
         <p:spPr>
           <a:xfrm>
             <a:off x="504000" y="226080"/>
-            <a:ext cx="9070920" cy="945720"/>
+            <a:ext cx="9070200" cy="945000"/>
           </a:xfrm>
           <a:prstGeom prst="rect">
             <a:avLst/>
@@ -3328,14 +4933,14 @@
       </p:sp>
       <p:sp>
         <p:nvSpPr>
-          <p:cNvPr id="77" name="CustomShape 2"/>
+          <p:cNvPr id="115" name="CustomShape 2"/>
           <p:cNvSpPr/>
           <p:nvPr/>
         </p:nvSpPr>
         <p:spPr>
           <a:xfrm>
             <a:off x="504000" y="1326600"/>
-            <a:ext cx="9070920" cy="3287520"/>
+            <a:ext cx="9070200" cy="3286800"/>
           </a:xfrm>
           <a:prstGeom prst="rect">
             <a:avLst/>
@@ -3354,7 +4959,7 @@
       </p:sp>
       <p:pic>
         <p:nvPicPr>
-          <p:cNvPr id="78" name="" descr=""/>
+          <p:cNvPr id="116" name="" descr=""/>
           <p:cNvPicPr/>
           <p:nvPr/>
         </p:nvPicPr>
@@ -3365,7 +4970,7 @@
         <p:spPr>
           <a:xfrm>
             <a:off x="144000" y="2518200"/>
-            <a:ext cx="8423280" cy="3097080"/>
+            <a:ext cx="8422560" cy="3096360"/>
           </a:xfrm>
           <a:prstGeom prst="rect">
             <a:avLst/>
@@ -3377,7 +4982,7 @@
       </p:pic>
       <p:pic>
         <p:nvPicPr>
-          <p:cNvPr id="79" name="" descr=""/>
+          <p:cNvPr id="117" name="" descr=""/>
           <p:cNvPicPr/>
           <p:nvPr/>
         </p:nvPicPr>
@@ -3388,7 +4993,7 @@
         <p:spPr>
           <a:xfrm>
             <a:off x="6264000" y="72000"/>
-            <a:ext cx="3707640" cy="2471400"/>
+            <a:ext cx="3706920" cy="2470680"/>
           </a:xfrm>
           <a:prstGeom prst="rect">
             <a:avLst/>
@@ -3430,14 +5035,14 @@
       </p:grpSpPr>
       <p:sp>
         <p:nvSpPr>
-          <p:cNvPr id="105" name="CustomShape 1"/>
+          <p:cNvPr id="143" name="CustomShape 1"/>
           <p:cNvSpPr/>
           <p:nvPr/>
         </p:nvSpPr>
         <p:spPr>
           <a:xfrm>
             <a:off x="504000" y="226080"/>
-            <a:ext cx="9070920" cy="945720"/>
+            <a:ext cx="9070200" cy="945000"/>
           </a:xfrm>
           <a:prstGeom prst="rect">
             <a:avLst/>
@@ -3486,14 +5091,14 @@
       </p:grpSpPr>
       <p:sp>
         <p:nvSpPr>
-          <p:cNvPr id="106" name="CustomShape 1"/>
+          <p:cNvPr id="144" name="CustomShape 1"/>
           <p:cNvSpPr/>
           <p:nvPr/>
         </p:nvSpPr>
         <p:spPr>
           <a:xfrm>
             <a:off x="504000" y="226080"/>
-            <a:ext cx="9070920" cy="945720"/>
+            <a:ext cx="9070200" cy="945000"/>
           </a:xfrm>
           <a:prstGeom prst="rect">
             <a:avLst/>
@@ -3512,14 +5117,14 @@
       </p:sp>
       <p:sp>
         <p:nvSpPr>
-          <p:cNvPr id="107" name="TextShape 2"/>
-          <p:cNvSpPr txBox="1"/>
+          <p:cNvPr id="145" name="CustomShape 2"/>
+          <p:cNvSpPr/>
           <p:nvPr/>
         </p:nvSpPr>
         <p:spPr>
           <a:xfrm>
             <a:off x="504000" y="226080"/>
-            <a:ext cx="9070920" cy="945720"/>
+            <a:ext cx="9070200" cy="945000"/>
           </a:xfrm>
           <a:prstGeom prst="rect">
             <a:avLst/>
@@ -3529,14 +5134,29 @@
             <a:noFill/>
           </a:ln>
         </p:spPr>
+        <p:style>
+          <a:lnRef idx="0"/>
+          <a:fillRef idx="0"/>
+          <a:effectRef idx="0"/>
+          <a:fontRef idx="minor"/>
+        </p:style>
         <p:txBody>
           <a:bodyPr lIns="0" rIns="0" tIns="0" bIns="0" anchor="ctr">
             <a:noAutofit/>
           </a:bodyPr>
           <a:p>
+            <a:pPr>
+              <a:lnSpc>
+                <a:spcPct val="100000"/>
+              </a:lnSpc>
+            </a:pPr>
             <a:r>
               <a:rPr b="0" lang="en-US" sz="4400" spc="-1" strike="noStrike">
-                <a:latin typeface="Arial"/>
+                <a:solidFill>
+                  <a:srgbClr val="000000"/>
+                </a:solidFill>
+                <a:latin typeface="Arial"/>
+                <a:ea typeface="DejaVu Sans"/>
               </a:rPr>
               <a:t>Chisel3</a:t>
             </a:r>
@@ -3548,14 +5168,14 @@
       </p:sp>
       <p:sp>
         <p:nvSpPr>
-          <p:cNvPr id="108" name="TextShape 3"/>
-          <p:cNvSpPr txBox="1"/>
+          <p:cNvPr id="146" name="CustomShape 3"/>
+          <p:cNvSpPr/>
           <p:nvPr/>
         </p:nvSpPr>
         <p:spPr>
           <a:xfrm>
             <a:off x="216000" y="1326600"/>
-            <a:ext cx="9576000" cy="3288240"/>
+            <a:ext cx="9575280" cy="3287520"/>
           </a:xfrm>
           <a:prstGeom prst="rect">
             <a:avLst/>
@@ -3565,12 +5185,18 @@
             <a:noFill/>
           </a:ln>
         </p:spPr>
+        <p:style>
+          <a:lnRef idx="0"/>
+          <a:fillRef idx="0"/>
+          <a:effectRef idx="0"/>
+          <a:fontRef idx="minor"/>
+        </p:style>
         <p:txBody>
           <a:bodyPr lIns="0" rIns="0" tIns="0" bIns="0">
             <a:normAutofit/>
           </a:bodyPr>
           <a:p>
-            <a:pPr marL="432000" indent="-324000">
+            <a:pPr marL="432000" indent="-323280">
               <a:lnSpc>
                 <a:spcPct val="100000"/>
               </a:lnSpc>
@@ -3583,19 +5209,31 @@
             </a:pPr>
             <a:r>
               <a:rPr b="0" lang="en-US" sz="1800" spc="-1" strike="noStrike">
-                <a:latin typeface="Arial"/>
+                <a:solidFill>
+                  <a:srgbClr val="000000"/>
+                </a:solidFill>
+                <a:latin typeface="Arial"/>
+                <a:ea typeface="DejaVu Sans"/>
               </a:rPr>
               <a:t>scala</a:t>
             </a:r>
             <a:r>
               <a:rPr b="0" lang="zh-CN" sz="1800" spc="-1" strike="noStrike">
-                <a:latin typeface="Arial"/>
+                <a:solidFill>
+                  <a:srgbClr val="000000"/>
+                </a:solidFill>
+                <a:latin typeface="Arial"/>
+                <a:ea typeface="DejaVu Sans"/>
               </a:rPr>
               <a:t>教程：</a:t>
             </a:r>
             <a:r>
               <a:rPr b="0" lang="en-US" sz="1800" spc="-1" strike="noStrike">
-                <a:latin typeface="Arial"/>
+                <a:solidFill>
+                  <a:srgbClr val="000000"/>
+                </a:solidFill>
+                <a:latin typeface="Arial"/>
+                <a:ea typeface="DejaVu Sans"/>
               </a:rPr>
               <a:t>https://www.runoob.com/scala/scala-tutorial.html</a:t>
             </a:r>
@@ -3604,7 +5242,7 @@
             </a:endParaRPr>
           </a:p>
           <a:p>
-            <a:pPr marL="432000" indent="-324000">
+            <a:pPr marL="432000" indent="-323280">
               <a:lnSpc>
                 <a:spcPct val="100000"/>
               </a:lnSpc>
@@ -3617,19 +5255,31 @@
             </a:pPr>
             <a:r>
               <a:rPr b="0" lang="en-US" sz="1800" spc="-1" strike="noStrike">
-                <a:latin typeface="Arial"/>
+                <a:solidFill>
+                  <a:srgbClr val="000000"/>
+                </a:solidFill>
+                <a:latin typeface="Arial"/>
+                <a:ea typeface="DejaVu Sans"/>
               </a:rPr>
               <a:t>chisel3</a:t>
             </a:r>
             <a:r>
               <a:rPr b="0" lang="zh-CN" sz="1800" spc="-1" strike="noStrike">
-                <a:latin typeface="Arial"/>
+                <a:solidFill>
+                  <a:srgbClr val="000000"/>
+                </a:solidFill>
+                <a:latin typeface="Arial"/>
+                <a:ea typeface="DejaVu Sans"/>
               </a:rPr>
               <a:t>官方在线资料：</a:t>
             </a:r>
             <a:r>
               <a:rPr b="0" lang="en-US" sz="1800" spc="-1" strike="noStrike">
-                <a:latin typeface="Arial"/>
+                <a:solidFill>
+                  <a:srgbClr val="000000"/>
+                </a:solidFill>
+                <a:latin typeface="Arial"/>
+                <a:ea typeface="DejaVu Sans"/>
               </a:rPr>
               <a:t>https://www.chisel-lang.org/chisel3/docs/introduction.html</a:t>
             </a:r>
@@ -3638,7 +5288,7 @@
             </a:endParaRPr>
           </a:p>
           <a:p>
-            <a:pPr marL="432000" indent="-324000">
+            <a:pPr marL="432000" indent="-323280">
               <a:lnSpc>
                 <a:spcPct val="100000"/>
               </a:lnSpc>
@@ -3651,6 +5301,9 @@
             </a:pPr>
             <a:r>
               <a:rPr b="0" lang="en-US" sz="1800" spc="-1" strike="noStrike">
+                <a:solidFill>
+                  <a:srgbClr val="000000"/>
+                </a:solidFill>
                 <a:latin typeface="Arial"/>
                 <a:ea typeface="Noto Sans CJK SC"/>
               </a:rPr>
@@ -3658,6 +5311,9 @@
             </a:r>
             <a:r>
               <a:rPr b="0" lang="zh-CN" sz="1800" spc="-1" strike="noStrike">
+                <a:solidFill>
+                  <a:srgbClr val="000000"/>
+                </a:solidFill>
                 <a:latin typeface="Arial"/>
                 <a:ea typeface="Noto Sans CJK SC"/>
               </a:rPr>
@@ -3665,7 +5321,11 @@
             </a:r>
             <a:r>
               <a:rPr b="0" lang="en-US" sz="1800" spc="-1" strike="noStrike">
-                <a:latin typeface="Arial"/>
+                <a:solidFill>
+                  <a:srgbClr val="000000"/>
+                </a:solidFill>
+                <a:latin typeface="Arial"/>
+                <a:ea typeface="Noto Sans CJK SC"/>
               </a:rPr>
               <a:t>https://www.chisel-lang.org/api/latest/#chisel3.util.package</a:t>
             </a:r>
@@ -3674,7 +5334,7 @@
             </a:endParaRPr>
           </a:p>
           <a:p>
-            <a:pPr marL="432000" indent="-324000">
+            <a:pPr marL="432000" indent="-323280">
               <a:lnSpc>
                 <a:spcPct val="100000"/>
               </a:lnSpc>
@@ -3687,34 +5347,40 @@
             </a:pPr>
             <a:r>
               <a:rPr b="0" lang="en-US" sz="1800" spc="-1" strike="noStrike">
-                <a:latin typeface="Arial"/>
+                <a:solidFill>
+                  <a:srgbClr val="000000"/>
+                </a:solidFill>
+                <a:latin typeface="Arial"/>
+                <a:ea typeface="Noto Sans CJK SC"/>
               </a:rPr>
               <a:t>chisel3</a:t>
             </a:r>
             <a:r>
               <a:rPr b="0" lang="zh-CN" sz="1800" spc="-1" strike="noStrike">
-                <a:latin typeface="Arial"/>
+                <a:solidFill>
+                  <a:srgbClr val="000000"/>
+                </a:solidFill>
+                <a:latin typeface="Arial"/>
+                <a:ea typeface="Noto Sans CJK SC"/>
               </a:rPr>
               <a:t>两页纸精华：</a:t>
             </a:r>
             <a:r>
               <a:rPr b="0" lang="en-US" sz="1800" spc="-1" strike="noStrike">
-                <a:latin typeface="Arial"/>
-              </a:rPr>
-              <a:t>https://github.com/freechipsproject/chisel-cheatsheet/releases/</a:t>
-            </a:r>
-            <a:r>
-              <a:rPr b="0" lang="en-US" sz="1800" spc="-1" strike="noStrike">
-                <a:latin typeface="Arial"/>
-              </a:rPr>
-              <a:t>latest/download/chisel_cheatsheet.pdf</a:t>
+                <a:solidFill>
+                  <a:srgbClr val="000000"/>
+                </a:solidFill>
+                <a:latin typeface="Arial"/>
+                <a:ea typeface="Noto Sans CJK SC"/>
+              </a:rPr>
+              <a:t>https://github.com/freechipsproject/chisel-cheatsheet/releases/latest/download/chisel_cheatsheet.pdf</a:t>
             </a:r>
             <a:endParaRPr b="0" lang="en-US" sz="1800" spc="-1" strike="noStrike">
               <a:latin typeface="Arial"/>
             </a:endParaRPr>
           </a:p>
           <a:p>
-            <a:pPr marL="432000" indent="-324000">
+            <a:pPr marL="432000" indent="-323280">
               <a:lnSpc>
                 <a:spcPct val="100000"/>
               </a:lnSpc>
@@ -3727,21 +5393,70 @@
             </a:pPr>
             <a:r>
               <a:rPr b="0" lang="en-US" sz="1800" spc="-1" strike="noStrike">
-                <a:latin typeface="Arial"/>
+                <a:solidFill>
+                  <a:srgbClr val="000000"/>
+                </a:solidFill>
+                <a:latin typeface="Arial"/>
+                <a:ea typeface="Noto Sans CJK SC"/>
               </a:rPr>
               <a:t>chisel3</a:t>
             </a:r>
             <a:r>
               <a:rPr b="0" lang="zh-CN" sz="1800" spc="-1" strike="noStrike">
-                <a:latin typeface="Arial"/>
+                <a:solidFill>
+                  <a:srgbClr val="000000"/>
+                </a:solidFill>
+                <a:latin typeface="Arial"/>
+                <a:ea typeface="Noto Sans CJK SC"/>
               </a:rPr>
               <a:t>官方书籍：</a:t>
             </a:r>
             <a:r>
               <a:rPr b="0" lang="en-US" sz="1800" spc="-1" strike="noStrike">
-                <a:latin typeface="Arial"/>
-              </a:rPr>
-              <a:t>https://github.com/schoeberl/chisel-book</a:t>
+                <a:solidFill>
+                  <a:srgbClr val="000000"/>
+                </a:solidFill>
+                <a:latin typeface="Arial"/>
+                <a:ea typeface="Noto Sans CJK SC"/>
+              </a:rPr>
+              <a:t>https://github.com/schoeberl/chisel-book, example code: </a:t>
+            </a:r>
+            <a:r>
+              <a:rPr b="0" lang="en-US" sz="1800" spc="-1" strike="noStrike">
+                <a:solidFill>
+                  <a:srgbClr val="000000"/>
+                </a:solidFill>
+                <a:latin typeface="Arial"/>
+                <a:ea typeface="Noto Sans CJK SC"/>
+                <a:hlinkClick r:id="rId1"/>
+              </a:rPr>
+              <a:t>https://github.com/schoeberl/chisel-examples.git</a:t>
+            </a:r>
+            <a:endParaRPr b="0" lang="en-US" sz="1800" spc="-1" strike="noStrike">
+              <a:latin typeface="Arial"/>
+            </a:endParaRPr>
+          </a:p>
+          <a:p>
+            <a:pPr marL="432000" indent="-323280">
+              <a:lnSpc>
+                <a:spcPct val="100000"/>
+              </a:lnSpc>
+              <a:buClr>
+                <a:srgbClr val="000000"/>
+              </a:buClr>
+              <a:buSzPct val="45000"/>
+              <a:buFont typeface="Wingdings" charset="2"/>
+              <a:buChar char=""/>
+            </a:pPr>
+            <a:r>
+              <a:rPr b="0" lang="en-US" sz="1800" spc="-1" strike="noStrike">
+                <a:solidFill>
+                  <a:srgbClr val="000000"/>
+                </a:solidFill>
+                <a:latin typeface="Arial"/>
+                <a:ea typeface="Noto Sans CJK SC"/>
+              </a:rPr>
+              <a:t> </a:t>
             </a:r>
             <a:endParaRPr b="0" lang="en-US" sz="1800" spc="-1" strike="noStrike">
               <a:latin typeface="Arial"/>
@@ -3781,14 +5496,14 @@
       </p:grpSpPr>
       <p:sp>
         <p:nvSpPr>
-          <p:cNvPr id="109" name="CustomShape 1"/>
+          <p:cNvPr id="147" name="CustomShape 1"/>
           <p:cNvSpPr/>
           <p:nvPr/>
         </p:nvSpPr>
         <p:spPr>
           <a:xfrm>
             <a:off x="504000" y="226080"/>
-            <a:ext cx="9070920" cy="945720"/>
+            <a:ext cx="9070200" cy="945000"/>
           </a:xfrm>
           <a:prstGeom prst="rect">
             <a:avLst/>
@@ -3816,7 +5531,11 @@
             </a:pPr>
             <a:r>
               <a:rPr b="0" lang="en-US" sz="4400" spc="-1" strike="noStrike">
-                <a:latin typeface="Arial"/>
+                <a:solidFill>
+                  <a:srgbClr val="000000"/>
+                </a:solidFill>
+                <a:latin typeface="Arial"/>
+                <a:ea typeface="DejaVu Sans"/>
               </a:rPr>
               <a:t>bus diplomacy</a:t>
             </a:r>
@@ -3828,14 +5547,14 @@
       </p:sp>
       <p:sp>
         <p:nvSpPr>
-          <p:cNvPr id="110" name="CustomShape 2"/>
+          <p:cNvPr id="148" name="CustomShape 2"/>
           <p:cNvSpPr/>
           <p:nvPr/>
         </p:nvSpPr>
         <p:spPr>
           <a:xfrm>
             <a:off x="504000" y="1326600"/>
-            <a:ext cx="9071640" cy="3288240"/>
+            <a:ext cx="9070920" cy="3287520"/>
           </a:xfrm>
           <a:prstGeom prst="rect">
             <a:avLst/>
@@ -3854,7 +5573,7 @@
       </p:sp>
       <p:pic>
         <p:nvPicPr>
-          <p:cNvPr id="111" name="" descr=""/>
+          <p:cNvPr id="149" name="" descr=""/>
           <p:cNvPicPr/>
           <p:nvPr/>
         </p:nvPicPr>
@@ -3865,7 +5584,7 @@
         <p:spPr>
           <a:xfrm>
             <a:off x="432000" y="1080000"/>
-            <a:ext cx="9288360" cy="4359960"/>
+            <a:ext cx="9287640" cy="4359240"/>
           </a:xfrm>
           <a:prstGeom prst="rect">
             <a:avLst/>
@@ -3877,14 +5596,14 @@
       </p:pic>
       <p:sp>
         <p:nvSpPr>
-          <p:cNvPr id="112" name="CustomShape 3"/>
+          <p:cNvPr id="150" name="CustomShape 3"/>
           <p:cNvSpPr/>
           <p:nvPr/>
         </p:nvSpPr>
         <p:spPr>
           <a:xfrm>
             <a:off x="478800" y="5256000"/>
-            <a:ext cx="7512840" cy="420840"/>
+            <a:ext cx="7512120" cy="420120"/>
           </a:xfrm>
           <a:prstGeom prst="rect">
             <a:avLst/>
@@ -3912,13 +5631,21 @@
             </a:pPr>
             <a:r>
               <a:rPr b="0" lang="zh-CN" sz="1800" spc="-1" strike="noStrike">
-                <a:latin typeface="Arial"/>
+                <a:solidFill>
+                  <a:srgbClr val="000000"/>
+                </a:solidFill>
+                <a:latin typeface="Arial"/>
+                <a:ea typeface="DejaVu Sans"/>
               </a:rPr>
               <a:t>来自：</a:t>
             </a:r>
             <a:r>
               <a:rPr b="0" lang="en-US" sz="1800" spc="-1" strike="noStrike">
-                <a:latin typeface="Arial"/>
+                <a:solidFill>
+                  <a:srgbClr val="000000"/>
+                </a:solidFill>
+                <a:latin typeface="Arial"/>
+                <a:ea typeface="DejaVu Sans"/>
               </a:rPr>
               <a:t>https://mp.weixin.qq.com/s/cTRxXwWNEeb4-XX_t4bRcg</a:t>
             </a:r>
@@ -3960,14 +5687,14 @@
       </p:grpSpPr>
       <p:sp>
         <p:nvSpPr>
-          <p:cNvPr id="113" name="CustomShape 1"/>
+          <p:cNvPr id="151" name="CustomShape 1"/>
           <p:cNvSpPr/>
           <p:nvPr/>
         </p:nvSpPr>
         <p:spPr>
           <a:xfrm>
             <a:off x="504000" y="226080"/>
-            <a:ext cx="9070920" cy="945720"/>
+            <a:ext cx="9070200" cy="945000"/>
           </a:xfrm>
           <a:prstGeom prst="rect">
             <a:avLst/>
@@ -3995,7 +5722,11 @@
             </a:pPr>
             <a:r>
               <a:rPr b="0" lang="en-US" sz="4400" spc="-1" strike="noStrike">
-                <a:latin typeface="Arial"/>
+                <a:solidFill>
+                  <a:srgbClr val="000000"/>
+                </a:solidFill>
+                <a:latin typeface="Arial"/>
+                <a:ea typeface="DejaVu Sans"/>
               </a:rPr>
               <a:t>bus diplomacy</a:t>
             </a:r>
@@ -4007,14 +5738,14 @@
       </p:sp>
       <p:sp>
         <p:nvSpPr>
-          <p:cNvPr id="114" name="CustomShape 2"/>
+          <p:cNvPr id="152" name="CustomShape 2"/>
           <p:cNvSpPr/>
           <p:nvPr/>
         </p:nvSpPr>
         <p:spPr>
           <a:xfrm>
             <a:off x="216000" y="5197320"/>
-            <a:ext cx="5473080" cy="346320"/>
+            <a:ext cx="5472360" cy="345600"/>
           </a:xfrm>
           <a:prstGeom prst="rect">
             <a:avLst/>
@@ -4042,7 +5773,11 @@
             </a:pPr>
             <a:r>
               <a:rPr b="0" lang="en-US" sz="1800" spc="-1" strike="noStrike">
-                <a:latin typeface="Arial"/>
+                <a:solidFill>
+                  <a:srgbClr val="000000"/>
+                </a:solidFill>
+                <a:latin typeface="Arial"/>
+                <a:ea typeface="DejaVu Sans"/>
               </a:rPr>
               <a:t>http://soft.cs.tsinghua.edu.cn/os2atc2018/ppt/rv1.pdf</a:t>
             </a:r>
@@ -4054,7 +5789,7 @@
       </p:sp>
       <p:pic>
         <p:nvPicPr>
-          <p:cNvPr id="115" name="" descr=""/>
+          <p:cNvPr id="153" name="" descr=""/>
           <p:cNvPicPr/>
           <p:nvPr/>
         </p:nvPicPr>
@@ -4065,7 +5800,7 @@
         <p:spPr>
           <a:xfrm>
             <a:off x="1728000" y="185400"/>
-            <a:ext cx="7847640" cy="4980600"/>
+            <a:ext cx="7846920" cy="4979880"/>
           </a:xfrm>
           <a:prstGeom prst="rect">
             <a:avLst/>
@@ -4107,14 +5842,14 @@
       </p:grpSpPr>
       <p:sp>
         <p:nvSpPr>
-          <p:cNvPr id="80" name="CustomShape 1"/>
+          <p:cNvPr id="118" name="CustomShape 1"/>
           <p:cNvSpPr/>
           <p:nvPr/>
         </p:nvSpPr>
         <p:spPr>
           <a:xfrm>
             <a:off x="144000" y="906120"/>
-            <a:ext cx="4679280" cy="4565160"/>
+            <a:ext cx="4678560" cy="4564440"/>
           </a:xfrm>
           <a:prstGeom prst="rect">
             <a:avLst/>
@@ -4148,7 +5883,7 @@
             </a:endParaRPr>
           </a:p>
           <a:p>
-            <a:pPr marL="432000" indent="-323280">
+            <a:pPr marL="432000" indent="-322560">
               <a:lnSpc>
                 <a:spcPct val="100000"/>
               </a:lnSpc>
@@ -4247,7 +5982,7 @@
             </a:endParaRPr>
           </a:p>
           <a:p>
-            <a:pPr marL="432000" indent="-323280">
+            <a:pPr marL="432000" indent="-322560">
               <a:lnSpc>
                 <a:spcPct val="100000"/>
               </a:lnSpc>
@@ -4336,7 +6071,7 @@
             </a:endParaRPr>
           </a:p>
           <a:p>
-            <a:pPr marL="432000" indent="-323280">
+            <a:pPr marL="432000" indent="-322560">
               <a:lnSpc>
                 <a:spcPct val="100000"/>
               </a:lnSpc>
@@ -4455,7 +6190,7 @@
             </a:endParaRPr>
           </a:p>
           <a:p>
-            <a:pPr marL="432000" indent="-323280">
+            <a:pPr marL="432000" indent="-322560">
               <a:lnSpc>
                 <a:spcPct val="100000"/>
               </a:lnSpc>
@@ -4634,7 +6369,7 @@
             </a:endParaRPr>
           </a:p>
           <a:p>
-            <a:pPr marL="432000" indent="-323280">
+            <a:pPr marL="432000" indent="-322560">
               <a:lnSpc>
                 <a:spcPct val="100000"/>
               </a:lnSpc>
@@ -4713,7 +6448,7 @@
             </a:endParaRPr>
           </a:p>
           <a:p>
-            <a:pPr marL="432000" indent="-323280">
+            <a:pPr marL="432000" indent="-322560">
               <a:lnSpc>
                 <a:spcPct val="100000"/>
               </a:lnSpc>
@@ -4852,7 +6587,7 @@
             </a:endParaRPr>
           </a:p>
           <a:p>
-            <a:pPr marL="432000" indent="-323280">
+            <a:pPr marL="432000" indent="-322560">
               <a:lnSpc>
                 <a:spcPct val="100000"/>
               </a:lnSpc>
@@ -4894,7 +6629,7 @@
       </p:sp>
       <p:pic>
         <p:nvPicPr>
-          <p:cNvPr id="81" name="" descr=""/>
+          <p:cNvPr id="119" name="" descr=""/>
           <p:cNvPicPr/>
           <p:nvPr/>
         </p:nvPicPr>
@@ -4905,7 +6640,7 @@
         <p:spPr>
           <a:xfrm>
             <a:off x="4752000" y="0"/>
-            <a:ext cx="5242680" cy="5668920"/>
+            <a:ext cx="5241960" cy="5668200"/>
           </a:xfrm>
           <a:prstGeom prst="rect">
             <a:avLst/>
@@ -4917,14 +6652,14 @@
       </p:pic>
       <p:sp>
         <p:nvSpPr>
-          <p:cNvPr id="82" name="CustomShape 2"/>
+          <p:cNvPr id="120" name="CustomShape 2"/>
           <p:cNvSpPr/>
           <p:nvPr/>
         </p:nvSpPr>
         <p:spPr>
           <a:xfrm>
             <a:off x="504000" y="226080"/>
-            <a:ext cx="9070920" cy="945720"/>
+            <a:ext cx="9070200" cy="945000"/>
           </a:xfrm>
           <a:prstGeom prst="rect">
             <a:avLst/>
@@ -5008,14 +6743,14 @@
       </p:grpSpPr>
       <p:sp>
         <p:nvSpPr>
-          <p:cNvPr id="83" name="CustomShape 1"/>
+          <p:cNvPr id="121" name="CustomShape 1"/>
           <p:cNvSpPr/>
           <p:nvPr/>
         </p:nvSpPr>
         <p:spPr>
           <a:xfrm>
             <a:off x="504000" y="226080"/>
-            <a:ext cx="9070920" cy="945720"/>
+            <a:ext cx="9070200" cy="945000"/>
           </a:xfrm>
           <a:prstGeom prst="rect">
             <a:avLst/>
@@ -5059,14 +6794,14 @@
       </p:sp>
       <p:sp>
         <p:nvSpPr>
-          <p:cNvPr id="84" name="CustomShape 2"/>
+          <p:cNvPr id="122" name="CustomShape 2"/>
           <p:cNvSpPr/>
           <p:nvPr/>
         </p:nvSpPr>
         <p:spPr>
           <a:xfrm>
             <a:off x="216000" y="1152000"/>
-            <a:ext cx="9646920" cy="1943280"/>
+            <a:ext cx="9646200" cy="1942560"/>
           </a:xfrm>
           <a:prstGeom prst="rect">
             <a:avLst/>
@@ -5087,7 +6822,7 @@
             <a:normAutofit fontScale="22000"/>
           </a:bodyPr>
           <a:p>
-            <a:pPr marL="432000" indent="-323280">
+            <a:pPr marL="432000" indent="-322560">
               <a:lnSpc>
                 <a:spcPct val="100000"/>
               </a:lnSpc>
@@ -5429,7 +7164,7 @@
       </p:sp>
       <p:pic>
         <p:nvPicPr>
-          <p:cNvPr id="85" name="" descr=""/>
+          <p:cNvPr id="123" name="" descr=""/>
           <p:cNvPicPr/>
           <p:nvPr/>
         </p:nvPicPr>
@@ -5440,7 +7175,7 @@
         <p:spPr>
           <a:xfrm>
             <a:off x="288000" y="3051720"/>
-            <a:ext cx="9647280" cy="2347560"/>
+            <a:ext cx="9646560" cy="2346840"/>
           </a:xfrm>
           <a:prstGeom prst="rect">
             <a:avLst/>
@@ -5482,14 +7217,14 @@
       </p:grpSpPr>
       <p:sp>
         <p:nvSpPr>
-          <p:cNvPr id="86" name="CustomShape 1"/>
+          <p:cNvPr id="124" name="CustomShape 1"/>
           <p:cNvSpPr/>
           <p:nvPr/>
         </p:nvSpPr>
         <p:spPr>
           <a:xfrm>
             <a:off x="504000" y="226080"/>
-            <a:ext cx="9070920" cy="945720"/>
+            <a:ext cx="9070200" cy="945000"/>
           </a:xfrm>
           <a:prstGeom prst="rect">
             <a:avLst/>
@@ -5543,14 +7278,14 @@
       </p:sp>
       <p:sp>
         <p:nvSpPr>
-          <p:cNvPr id="87" name="CustomShape 2"/>
+          <p:cNvPr id="125" name="CustomShape 2"/>
           <p:cNvSpPr/>
           <p:nvPr/>
         </p:nvSpPr>
         <p:spPr>
           <a:xfrm>
             <a:off x="3528000" y="-216000"/>
-            <a:ext cx="6478920" cy="1943280"/>
+            <a:ext cx="6478200" cy="1942560"/>
           </a:xfrm>
           <a:prstGeom prst="rect">
             <a:avLst/>
@@ -5584,7 +7319,7 @@
             </a:endParaRPr>
           </a:p>
           <a:p>
-            <a:pPr marL="432000" indent="-323280">
+            <a:pPr marL="432000" indent="-322560">
               <a:lnSpc>
                 <a:spcPct val="100000"/>
               </a:lnSpc>
@@ -5743,7 +7478,7 @@
             </a:endParaRPr>
           </a:p>
           <a:p>
-            <a:pPr marL="432000" indent="-323280">
+            <a:pPr marL="432000" indent="-322560">
               <a:lnSpc>
                 <a:spcPct val="100000"/>
               </a:lnSpc>
@@ -5785,7 +7520,7 @@
       </p:sp>
       <p:pic>
         <p:nvPicPr>
-          <p:cNvPr id="88" name="" descr=""/>
+          <p:cNvPr id="126" name="" descr=""/>
           <p:cNvPicPr/>
           <p:nvPr/>
         </p:nvPicPr>
@@ -5796,7 +7531,7 @@
         <p:spPr>
           <a:xfrm>
             <a:off x="0" y="1440000"/>
-            <a:ext cx="10078920" cy="4233600"/>
+            <a:ext cx="10078200" cy="4232880"/>
           </a:xfrm>
           <a:prstGeom prst="rect">
             <a:avLst/>
@@ -5838,14 +7573,14 @@
       </p:grpSpPr>
       <p:sp>
         <p:nvSpPr>
-          <p:cNvPr id="89" name="CustomShape 1"/>
+          <p:cNvPr id="127" name="CustomShape 1"/>
           <p:cNvSpPr/>
           <p:nvPr/>
         </p:nvSpPr>
         <p:spPr>
           <a:xfrm>
             <a:off x="504000" y="226080"/>
-            <a:ext cx="9070920" cy="945720"/>
+            <a:ext cx="9070200" cy="945000"/>
           </a:xfrm>
           <a:prstGeom prst="rect">
             <a:avLst/>
@@ -5889,14 +7624,14 @@
       </p:sp>
       <p:sp>
         <p:nvSpPr>
-          <p:cNvPr id="90" name="CustomShape 2"/>
+          <p:cNvPr id="128" name="CustomShape 2"/>
           <p:cNvSpPr/>
           <p:nvPr/>
         </p:nvSpPr>
         <p:spPr>
           <a:xfrm>
             <a:off x="389880" y="4834440"/>
-            <a:ext cx="7169400" cy="601560"/>
+            <a:ext cx="7168680" cy="600840"/>
           </a:xfrm>
           <a:prstGeom prst="rect">
             <a:avLst/>
@@ -5960,7 +7695,7 @@
       </p:sp>
       <p:pic>
         <p:nvPicPr>
-          <p:cNvPr id="91" name="" descr=""/>
+          <p:cNvPr id="129" name="" descr=""/>
           <p:cNvPicPr/>
           <p:nvPr/>
         </p:nvPicPr>
@@ -5971,7 +7706,7 @@
         <p:spPr>
           <a:xfrm>
             <a:off x="72360" y="1152000"/>
-            <a:ext cx="10078920" cy="3547080"/>
+            <a:ext cx="10078200" cy="3546360"/>
           </a:xfrm>
           <a:prstGeom prst="rect">
             <a:avLst/>
@@ -6013,14 +7748,14 @@
       </p:grpSpPr>
       <p:sp>
         <p:nvSpPr>
-          <p:cNvPr id="92" name="CustomShape 1"/>
+          <p:cNvPr id="130" name="CustomShape 1"/>
           <p:cNvSpPr/>
           <p:nvPr/>
         </p:nvSpPr>
         <p:spPr>
           <a:xfrm>
             <a:off x="504000" y="226080"/>
-            <a:ext cx="9070920" cy="945720"/>
+            <a:ext cx="9070200" cy="945000"/>
           </a:xfrm>
           <a:prstGeom prst="rect">
             <a:avLst/>
@@ -6064,14 +7799,14 @@
       </p:sp>
       <p:sp>
         <p:nvSpPr>
-          <p:cNvPr id="93" name="CustomShape 2"/>
+          <p:cNvPr id="131" name="CustomShape 2"/>
           <p:cNvSpPr/>
           <p:nvPr/>
         </p:nvSpPr>
         <p:spPr>
           <a:xfrm>
             <a:off x="101880" y="4680000"/>
-            <a:ext cx="7169400" cy="601560"/>
+            <a:ext cx="7168680" cy="600840"/>
           </a:xfrm>
           <a:prstGeom prst="rect">
             <a:avLst/>
@@ -6135,7 +7870,7 @@
       </p:sp>
       <p:pic>
         <p:nvPicPr>
-          <p:cNvPr id="94" name="" descr=""/>
+          <p:cNvPr id="132" name="" descr=""/>
           <p:cNvPicPr/>
           <p:nvPr/>
         </p:nvPicPr>
@@ -6146,7 +7881,7 @@
         <p:spPr>
           <a:xfrm>
             <a:off x="3816000" y="34200"/>
-            <a:ext cx="6119280" cy="5641560"/>
+            <a:ext cx="6118560" cy="5640840"/>
           </a:xfrm>
           <a:prstGeom prst="rect">
             <a:avLst/>
@@ -6188,14 +7923,14 @@
       </p:grpSpPr>
       <p:sp>
         <p:nvSpPr>
-          <p:cNvPr id="95" name="CustomShape 1"/>
+          <p:cNvPr id="133" name="CustomShape 1"/>
           <p:cNvSpPr/>
           <p:nvPr/>
         </p:nvSpPr>
         <p:spPr>
           <a:xfrm>
             <a:off x="504000" y="226080"/>
-            <a:ext cx="9070920" cy="945720"/>
+            <a:ext cx="9070200" cy="945000"/>
           </a:xfrm>
           <a:prstGeom prst="rect">
             <a:avLst/>
@@ -6214,7 +7949,7 @@
       </p:sp>
       <p:pic>
         <p:nvPicPr>
-          <p:cNvPr id="96" name="" descr=""/>
+          <p:cNvPr id="134" name="" descr=""/>
           <p:cNvPicPr/>
           <p:nvPr/>
         </p:nvPicPr>
@@ -6225,7 +7960,7 @@
         <p:spPr>
           <a:xfrm>
             <a:off x="144000" y="3816000"/>
-            <a:ext cx="9863280" cy="1338120"/>
+            <a:ext cx="9862560" cy="1337400"/>
           </a:xfrm>
           <a:prstGeom prst="rect">
             <a:avLst/>
@@ -6237,7 +7972,7 @@
       </p:pic>
       <p:pic>
         <p:nvPicPr>
-          <p:cNvPr id="97" name="" descr=""/>
+          <p:cNvPr id="135" name="" descr=""/>
           <p:cNvPicPr/>
           <p:nvPr/>
         </p:nvPicPr>
@@ -6248,7 +7983,7 @@
         <p:spPr>
           <a:xfrm>
             <a:off x="216360" y="169920"/>
-            <a:ext cx="9646920" cy="3645360"/>
+            <a:ext cx="9646200" cy="3644640"/>
           </a:xfrm>
           <a:prstGeom prst="rect">
             <a:avLst/>
@@ -6290,14 +8025,14 @@
       </p:grpSpPr>
       <p:sp>
         <p:nvSpPr>
-          <p:cNvPr id="98" name="CustomShape 1"/>
+          <p:cNvPr id="136" name="CustomShape 1"/>
           <p:cNvSpPr/>
           <p:nvPr/>
         </p:nvSpPr>
         <p:spPr>
           <a:xfrm>
             <a:off x="360000" y="216000"/>
-            <a:ext cx="9070920" cy="1621080"/>
+            <a:ext cx="9070200" cy="1620360"/>
           </a:xfrm>
           <a:prstGeom prst="rect">
             <a:avLst/>
@@ -6362,14 +8097,14 @@
       </p:sp>
       <p:sp>
         <p:nvSpPr>
-          <p:cNvPr id="99" name="CustomShape 2"/>
+          <p:cNvPr id="137" name="CustomShape 2"/>
           <p:cNvSpPr/>
           <p:nvPr/>
         </p:nvSpPr>
         <p:spPr>
           <a:xfrm>
             <a:off x="504000" y="1326600"/>
-            <a:ext cx="9070920" cy="3287520"/>
+            <a:ext cx="9070200" cy="3286800"/>
           </a:xfrm>
           <a:prstGeom prst="rect">
             <a:avLst/>
@@ -6388,7 +8123,7 @@
       </p:sp>
       <p:pic>
         <p:nvPicPr>
-          <p:cNvPr id="100" name="" descr=""/>
+          <p:cNvPr id="138" name="" descr=""/>
           <p:cNvPicPr/>
           <p:nvPr/>
         </p:nvPicPr>
@@ -6399,7 +8134,7 @@
         <p:spPr>
           <a:xfrm>
             <a:off x="4808520" y="72000"/>
-            <a:ext cx="4605120" cy="4337640"/>
+            <a:ext cx="4604400" cy="4336920"/>
           </a:xfrm>
           <a:prstGeom prst="rect">
             <a:avLst/>
@@ -6411,7 +8146,7 @@
       </p:pic>
       <p:pic>
         <p:nvPicPr>
-          <p:cNvPr id="101" name="" descr=""/>
+          <p:cNvPr id="139" name="" descr=""/>
           <p:cNvPicPr/>
           <p:nvPr/>
         </p:nvPicPr>
@@ -6422,7 +8157,7 @@
         <p:spPr>
           <a:xfrm>
             <a:off x="216000" y="4104000"/>
-            <a:ext cx="6211800" cy="1511280"/>
+            <a:ext cx="6211080" cy="1510560"/>
           </a:xfrm>
           <a:prstGeom prst="rect">
             <a:avLst/>
@@ -6464,14 +8199,14 @@
       </p:grpSpPr>
       <p:sp>
         <p:nvSpPr>
-          <p:cNvPr id="102" name="CustomShape 1"/>
+          <p:cNvPr id="140" name="CustomShape 1"/>
           <p:cNvSpPr/>
           <p:nvPr/>
         </p:nvSpPr>
         <p:spPr>
           <a:xfrm>
             <a:off x="504000" y="226080"/>
-            <a:ext cx="9070920" cy="945720"/>
+            <a:ext cx="9070200" cy="945000"/>
           </a:xfrm>
           <a:prstGeom prst="rect">
             <a:avLst/>
@@ -6525,14 +8260,14 @@
       </p:sp>
       <p:sp>
         <p:nvSpPr>
-          <p:cNvPr id="103" name="CustomShape 2"/>
+          <p:cNvPr id="141" name="CustomShape 2"/>
           <p:cNvSpPr/>
           <p:nvPr/>
         </p:nvSpPr>
         <p:spPr>
           <a:xfrm>
             <a:off x="216360" y="822600"/>
-            <a:ext cx="9718920" cy="4144680"/>
+            <a:ext cx="9718200" cy="4143960"/>
           </a:xfrm>
           <a:prstGeom prst="rect">
             <a:avLst/>
@@ -7007,14 +8742,14 @@
       </p:sp>
       <p:sp>
         <p:nvSpPr>
-          <p:cNvPr id="104" name="CustomShape 3"/>
+          <p:cNvPr id="142" name="CustomShape 3"/>
           <p:cNvSpPr/>
           <p:nvPr/>
         </p:nvSpPr>
         <p:spPr>
           <a:xfrm>
             <a:off x="91440" y="4824000"/>
-            <a:ext cx="9843840" cy="791280"/>
+            <a:ext cx="9843120" cy="790560"/>
           </a:xfrm>
           <a:prstGeom prst="rect">
             <a:avLst/>
@@ -7549,4 +9284,230 @@
     </a:fmtScheme>
   </a:themeElements>
 </a:theme>
+</file>
+
+<file path=ppt/theme/theme3.xml><?xml version="1.0" encoding="utf-8"?>
+<a:theme xmlns:a="http://schemas.openxmlformats.org/drawingml/2006/main" name="Office Theme">
+  <a:themeElements>
+    <a:clrScheme name="Office">
+      <a:dk1>
+        <a:sysClr val="windowText" lastClr="000000"/>
+      </a:dk1>
+      <a:lt1>
+        <a:sysClr val="window" lastClr="FFFFFF"/>
+      </a:lt1>
+      <a:dk2>
+        <a:srgbClr val="1f497d"/>
+      </a:dk2>
+      <a:lt2>
+        <a:srgbClr val="eeece1"/>
+      </a:lt2>
+      <a:accent1>
+        <a:srgbClr val="4f81bd"/>
+      </a:accent1>
+      <a:accent2>
+        <a:srgbClr val="c0504d"/>
+      </a:accent2>
+      <a:accent3>
+        <a:srgbClr val="9bbb59"/>
+      </a:accent3>
+      <a:accent4>
+        <a:srgbClr val="8064a2"/>
+      </a:accent4>
+      <a:accent5>
+        <a:srgbClr val="4bacc6"/>
+      </a:accent5>
+      <a:accent6>
+        <a:srgbClr val="f79646"/>
+      </a:accent6>
+      <a:hlink>
+        <a:srgbClr val="0000ff"/>
+      </a:hlink>
+      <a:folHlink>
+        <a:srgbClr val="800080"/>
+      </a:folHlink>
+    </a:clrScheme>
+    <a:fontScheme name="Office">
+      <a:majorFont>
+        <a:latin typeface="Arial"/>
+        <a:ea typeface="DejaVu Sans"/>
+        <a:cs typeface="DejaVu Sans"/>
+      </a:majorFont>
+      <a:minorFont>
+        <a:latin typeface="Arial"/>
+        <a:ea typeface="DejaVu Sans"/>
+        <a:cs typeface="DejaVu Sans"/>
+      </a:minorFont>
+    </a:fontScheme>
+    <a:fmtScheme name="Office">
+      <a:fillStyleLst>
+        <a:solidFill>
+          <a:schemeClr val="phClr"/>
+        </a:solidFill>
+        <a:gradFill rotWithShape="1">
+          <a:gsLst>
+            <a:gs pos="0">
+              <a:schemeClr val="phClr">
+                <a:tint val="50000"/>
+                <a:satMod val="300000"/>
+              </a:schemeClr>
+            </a:gs>
+            <a:gs pos="35000">
+              <a:schemeClr val="phClr">
+                <a:tint val="37000"/>
+                <a:satMod val="300000"/>
+              </a:schemeClr>
+            </a:gs>
+            <a:gs pos="100000">
+              <a:schemeClr val="phClr">
+                <a:tint val="15000"/>
+                <a:satMod val="350000"/>
+              </a:schemeClr>
+            </a:gs>
+          </a:gsLst>
+          <a:lin ang="16200000" scaled="1"/>
+        </a:gradFill>
+        <a:gradFill rotWithShape="1">
+          <a:gsLst>
+            <a:gs pos="0">
+              <a:schemeClr val="phClr">
+                <a:shade val="51000"/>
+                <a:satMod val="130000"/>
+              </a:schemeClr>
+            </a:gs>
+            <a:gs pos="80000">
+              <a:schemeClr val="phClr">
+                <a:shade val="93000"/>
+                <a:satMod val="130000"/>
+              </a:schemeClr>
+            </a:gs>
+            <a:gs pos="100000">
+              <a:schemeClr val="phClr">
+                <a:shade val="94000"/>
+                <a:satMod val="135000"/>
+              </a:schemeClr>
+            </a:gs>
+          </a:gsLst>
+          <a:lin ang="16200000" scaled="0"/>
+        </a:gradFill>
+      </a:fillStyleLst>
+      <a:lnStyleLst>
+        <a:ln w="9525" cap="flat" cmpd="sng" algn="ctr">
+          <a:solidFill>
+            <a:schemeClr val="phClr">
+              <a:shade val="95000"/>
+              <a:satMod val="105000"/>
+            </a:schemeClr>
+          </a:solidFill>
+          <a:prstDash val="solid"/>
+          <a:miter/>
+        </a:ln>
+        <a:ln w="25400" cap="flat" cmpd="sng" algn="ctr">
+          <a:solidFill>
+            <a:schemeClr val="phClr"/>
+          </a:solidFill>
+          <a:prstDash val="solid"/>
+          <a:miter/>
+        </a:ln>
+        <a:ln w="38100" cap="flat" cmpd="sng" algn="ctr">
+          <a:solidFill>
+            <a:schemeClr val="phClr"/>
+          </a:solidFill>
+          <a:prstDash val="solid"/>
+          <a:miter/>
+        </a:ln>
+      </a:lnStyleLst>
+      <a:effectStyleLst>
+        <a:effectStyle>
+          <a:effectLst>
+            <a:outerShdw blurRad="40000" dist="20000" dir="5400000" rotWithShape="0">
+              <a:srgbClr val="000000">
+                <a:alpha val="38000"/>
+              </a:srgbClr>
+            </a:outerShdw>
+          </a:effectLst>
+        </a:effectStyle>
+        <a:effectStyle>
+          <a:effectLst>
+            <a:outerShdw blurRad="40000" dist="23000" dir="5400000" rotWithShape="0">
+              <a:srgbClr val="000000">
+                <a:alpha val="35000"/>
+              </a:srgbClr>
+            </a:outerShdw>
+          </a:effectLst>
+        </a:effectStyle>
+        <a:effectStyle>
+          <a:effectLst>
+            <a:outerShdw blurRad="40000" dist="23000" dir="5400000" rotWithShape="0">
+              <a:srgbClr val="000000">
+                <a:alpha val="35000"/>
+              </a:srgbClr>
+            </a:outerShdw>
+          </a:effectLst>
+          <a:scene3d>
+            <a:camera prst="orthographicFront">
+              <a:rot lat="0" lon="0" rev="0"/>
+            </a:camera>
+            <a:lightRig rig="threePt" dir="t">
+              <a:rot lat="0" lon="0" rev="1200000"/>
+            </a:lightRig>
+          </a:scene3d>
+          <a:sp3d>
+            <a:bevelT w="63500" h="25400"/>
+          </a:sp3d>
+        </a:effectStyle>
+      </a:effectStyleLst>
+      <a:bgFillStyleLst>
+        <a:solidFill>
+          <a:schemeClr val="phClr"/>
+        </a:solidFill>
+        <a:gradFill rotWithShape="1">
+          <a:gsLst>
+            <a:gs pos="0">
+              <a:schemeClr val="phClr">
+                <a:tint val="40000"/>
+                <a:satMod val="350000"/>
+              </a:schemeClr>
+            </a:gs>
+            <a:gs pos="40000">
+              <a:schemeClr val="phClr">
+                <a:tint val="45000"/>
+                <a:shade val="99000"/>
+                <a:satMod val="350000"/>
+              </a:schemeClr>
+            </a:gs>
+            <a:gs pos="100000">
+              <a:schemeClr val="phClr">
+                <a:shade val="20000"/>
+                <a:satMod val="255000"/>
+              </a:schemeClr>
+            </a:gs>
+          </a:gsLst>
+          <a:path path="circle">
+            <a:fillToRect l="50000" t="-80000" r="50000" b="180000"/>
+          </a:path>
+        </a:gradFill>
+        <a:gradFill rotWithShape="1">
+          <a:gsLst>
+            <a:gs pos="0">
+              <a:schemeClr val="phClr">
+                <a:tint val="80000"/>
+                <a:satMod val="300000"/>
+              </a:schemeClr>
+            </a:gs>
+            <a:gs pos="100000">
+              <a:schemeClr val="phClr">
+                <a:shade val="30000"/>
+                <a:satMod val="200000"/>
+              </a:schemeClr>
+            </a:gs>
+          </a:gsLst>
+          <a:path path="circle">
+            <a:fillToRect l="50000" t="50000" r="50000" b="50000"/>
+          </a:path>
+        </a:gradFill>
+      </a:bgFillStyleLst>
+    </a:fmtScheme>
+  </a:themeElements>
+</a:theme>
 </file>
</xml_diff>